<commit_message>
Chart axis correction and improved power point.
</commit_message>
<xml_diff>
--- a/Housing_Bubble.pptx
+++ b/Housing_Bubble.pptx
@@ -6,30 +6,34 @@
   </p:sldMasterIdLst>
   <p:sldIdLst>
     <p:sldId id="256" r:id="rId2"/>
-    <p:sldId id="257" r:id="rId3"/>
-    <p:sldId id="258" r:id="rId4"/>
-    <p:sldId id="278" r:id="rId5"/>
-    <p:sldId id="260" r:id="rId6"/>
-    <p:sldId id="265" r:id="rId7"/>
-    <p:sldId id="267" r:id="rId8"/>
-    <p:sldId id="264" r:id="rId9"/>
-    <p:sldId id="263" r:id="rId10"/>
-    <p:sldId id="262" r:id="rId11"/>
-    <p:sldId id="268" r:id="rId12"/>
-    <p:sldId id="261" r:id="rId13"/>
-    <p:sldId id="269" r:id="rId14"/>
-    <p:sldId id="270" r:id="rId15"/>
-    <p:sldId id="271" r:id="rId16"/>
-    <p:sldId id="272" r:id="rId17"/>
-    <p:sldId id="273" r:id="rId18"/>
-    <p:sldId id="274" r:id="rId19"/>
-    <p:sldId id="275" r:id="rId20"/>
-    <p:sldId id="276" r:id="rId21"/>
-    <p:sldId id="277" r:id="rId22"/>
-    <p:sldId id="259" r:id="rId23"/>
-    <p:sldId id="279" r:id="rId24"/>
-    <p:sldId id="280" r:id="rId25"/>
-    <p:sldId id="266" r:id="rId26"/>
+    <p:sldId id="258" r:id="rId3"/>
+    <p:sldId id="257" r:id="rId4"/>
+    <p:sldId id="281" r:id="rId5"/>
+    <p:sldId id="278" r:id="rId6"/>
+    <p:sldId id="260" r:id="rId7"/>
+    <p:sldId id="265" r:id="rId8"/>
+    <p:sldId id="267" r:id="rId9"/>
+    <p:sldId id="264" r:id="rId10"/>
+    <p:sldId id="263" r:id="rId11"/>
+    <p:sldId id="262" r:id="rId12"/>
+    <p:sldId id="268" r:id="rId13"/>
+    <p:sldId id="261" r:id="rId14"/>
+    <p:sldId id="269" r:id="rId15"/>
+    <p:sldId id="270" r:id="rId16"/>
+    <p:sldId id="271" r:id="rId17"/>
+    <p:sldId id="272" r:id="rId18"/>
+    <p:sldId id="273" r:id="rId19"/>
+    <p:sldId id="274" r:id="rId20"/>
+    <p:sldId id="275" r:id="rId21"/>
+    <p:sldId id="276" r:id="rId22"/>
+    <p:sldId id="277" r:id="rId23"/>
+    <p:sldId id="285" r:id="rId24"/>
+    <p:sldId id="259" r:id="rId25"/>
+    <p:sldId id="279" r:id="rId26"/>
+    <p:sldId id="282" r:id="rId27"/>
+    <p:sldId id="283" r:id="rId28"/>
+    <p:sldId id="280" r:id="rId29"/>
+    <p:sldId id="266" r:id="rId30"/>
   </p:sldIdLst>
   <p:sldSz cx="12192000" cy="6858000"/>
   <p:notesSz cx="6858000" cy="9144000"/>
@@ -136,6 +140,32 @@
 </p:presentation>
 </file>
 
+<file path=ppt/commentAuthors.xml><?xml version="1.0" encoding="utf-8"?>
+<p:cmAuthorLst xmlns:a="http://schemas.openxmlformats.org/drawingml/2006/main" xmlns:r="http://schemas.openxmlformats.org/officeDocument/2006/relationships" xmlns:p="http://schemas.openxmlformats.org/presentationml/2006/main">
+  <p:cmAuthor id="1" name="Bowie Hand" initials="BH" lastIdx="3" clrIdx="0">
+    <p:extLst>
+      <p:ext uri="{19B8F6BF-5375-455C-9EA6-DF929625EA0E}">
+        <p15:presenceInfo xmlns:p15="http://schemas.microsoft.com/office/powerpoint/2012/main" userId="c8bf645ece8bbbdd" providerId="Windows Live"/>
+      </p:ext>
+    </p:extLst>
+  </p:cmAuthor>
+</p:cmAuthorLst>
+</file>
+
+<file path=ppt/comments/comment1.xml><?xml version="1.0" encoding="utf-8"?>
+<p:cmLst xmlns:a="http://schemas.openxmlformats.org/drawingml/2006/main" xmlns:r="http://schemas.openxmlformats.org/officeDocument/2006/relationships" xmlns:p="http://schemas.openxmlformats.org/presentationml/2006/main">
+  <p:cm authorId="1" dt="2018-09-05T06:53:29.396" idx="3">
+    <p:pos x="10" y="10"/>
+    <p:text>Add trendline</p:text>
+    <p:extLst>
+      <p:ext uri="{C676402C-5697-4E1C-873F-D02D1690AC5C}">
+        <p15:threadingInfo xmlns:p15="http://schemas.microsoft.com/office/powerpoint/2012/main" timeZoneBias="300"/>
+      </p:ext>
+    </p:extLst>
+  </p:cm>
+</p:cmLst>
+</file>
+
 <file path=ppt/slideLayouts/slideLayout1.xml><?xml version="1.0" encoding="utf-8"?>
 <p:sldLayout xmlns:a="http://schemas.openxmlformats.org/drawingml/2006/main" xmlns:r="http://schemas.openxmlformats.org/officeDocument/2006/relationships" xmlns:p="http://schemas.openxmlformats.org/presentationml/2006/main" type="title" preserve="1">
   <p:cSld name="Title Slide">
@@ -283,7 +313,7 @@
           <a:p>
             <a:fld id="{E28927AC-631E-4A5A-9F67-1B6BE6A01BE1}" type="datetimeFigureOut">
               <a:rPr lang="en-US" smtClean="0"/>
-              <a:t>9/3/2018</a:t>
+              <a:t>9/5/2018</a:t>
             </a:fld>
             <a:endParaRPr lang="en-US"/>
           </a:p>
@@ -481,7 +511,7 @@
           <a:p>
             <a:fld id="{E28927AC-631E-4A5A-9F67-1B6BE6A01BE1}" type="datetimeFigureOut">
               <a:rPr lang="en-US" smtClean="0"/>
-              <a:t>9/3/2018</a:t>
+              <a:t>9/5/2018</a:t>
             </a:fld>
             <a:endParaRPr lang="en-US"/>
           </a:p>
@@ -689,7 +719,7 @@
           <a:p>
             <a:fld id="{E28927AC-631E-4A5A-9F67-1B6BE6A01BE1}" type="datetimeFigureOut">
               <a:rPr lang="en-US" smtClean="0"/>
-              <a:t>9/3/2018</a:t>
+              <a:t>9/5/2018</a:t>
             </a:fld>
             <a:endParaRPr lang="en-US"/>
           </a:p>
@@ -887,7 +917,7 @@
           <a:p>
             <a:fld id="{E28927AC-631E-4A5A-9F67-1B6BE6A01BE1}" type="datetimeFigureOut">
               <a:rPr lang="en-US" smtClean="0"/>
-              <a:t>9/3/2018</a:t>
+              <a:t>9/5/2018</a:t>
             </a:fld>
             <a:endParaRPr lang="en-US"/>
           </a:p>
@@ -1162,7 +1192,7 @@
           <a:p>
             <a:fld id="{E28927AC-631E-4A5A-9F67-1B6BE6A01BE1}" type="datetimeFigureOut">
               <a:rPr lang="en-US" smtClean="0"/>
-              <a:t>9/3/2018</a:t>
+              <a:t>9/5/2018</a:t>
             </a:fld>
             <a:endParaRPr lang="en-US"/>
           </a:p>
@@ -1427,7 +1457,7 @@
           <a:p>
             <a:fld id="{E28927AC-631E-4A5A-9F67-1B6BE6A01BE1}" type="datetimeFigureOut">
               <a:rPr lang="en-US" smtClean="0"/>
-              <a:t>9/3/2018</a:t>
+              <a:t>9/5/2018</a:t>
             </a:fld>
             <a:endParaRPr lang="en-US"/>
           </a:p>
@@ -1839,7 +1869,7 @@
           <a:p>
             <a:fld id="{E28927AC-631E-4A5A-9F67-1B6BE6A01BE1}" type="datetimeFigureOut">
               <a:rPr lang="en-US" smtClean="0"/>
-              <a:t>9/3/2018</a:t>
+              <a:t>9/5/2018</a:t>
             </a:fld>
             <a:endParaRPr lang="en-US"/>
           </a:p>
@@ -1980,7 +2010,7 @@
           <a:p>
             <a:fld id="{E28927AC-631E-4A5A-9F67-1B6BE6A01BE1}" type="datetimeFigureOut">
               <a:rPr lang="en-US" smtClean="0"/>
-              <a:t>9/3/2018</a:t>
+              <a:t>9/5/2018</a:t>
             </a:fld>
             <a:endParaRPr lang="en-US"/>
           </a:p>
@@ -2093,7 +2123,7 @@
           <a:p>
             <a:fld id="{E28927AC-631E-4A5A-9F67-1B6BE6A01BE1}" type="datetimeFigureOut">
               <a:rPr lang="en-US" smtClean="0"/>
-              <a:t>9/3/2018</a:t>
+              <a:t>9/5/2018</a:t>
             </a:fld>
             <a:endParaRPr lang="en-US"/>
           </a:p>
@@ -2404,7 +2434,7 @@
           <a:p>
             <a:fld id="{E28927AC-631E-4A5A-9F67-1B6BE6A01BE1}" type="datetimeFigureOut">
               <a:rPr lang="en-US" smtClean="0"/>
-              <a:t>9/3/2018</a:t>
+              <a:t>9/5/2018</a:t>
             </a:fld>
             <a:endParaRPr lang="en-US"/>
           </a:p>
@@ -2692,7 +2722,7 @@
           <a:p>
             <a:fld id="{E28927AC-631E-4A5A-9F67-1B6BE6A01BE1}" type="datetimeFigureOut">
               <a:rPr lang="en-US" smtClean="0"/>
-              <a:t>9/3/2018</a:t>
+              <a:t>9/5/2018</a:t>
             </a:fld>
             <a:endParaRPr lang="en-US"/>
           </a:p>
@@ -2933,7 +2963,7 @@
           <a:p>
             <a:fld id="{E28927AC-631E-4A5A-9F67-1B6BE6A01BE1}" type="datetimeFigureOut">
               <a:rPr lang="en-US" smtClean="0"/>
-              <a:t>9/3/2018</a:t>
+              <a:t>9/5/2018</a:t>
             </a:fld>
             <a:endParaRPr lang="en-US"/>
           </a:p>
@@ -3396,14 +3426,253 @@
             <p:ph type="subTitle" idx="1"/>
           </p:nvPr>
         </p:nvSpPr>
-        <p:spPr/>
-        <p:txBody>
-          <a:bodyPr/>
-          <a:lstStyle/>
-          <a:p>
-            <a:r>
-              <a:rPr lang="en-US" dirty="0"/>
+        <p:spPr>
+          <a:xfrm>
+            <a:off x="1524000" y="3602038"/>
+            <a:ext cx="9144000" cy="590931"/>
+          </a:xfrm>
+        </p:spPr>
+        <p:txBody>
+          <a:bodyPr>
+            <a:spAutoFit/>
+          </a:bodyPr>
+          <a:lstStyle/>
+          <a:p>
+            <a:r>
+              <a:rPr lang="en-US" sz="3600" dirty="0"/>
               <a:t>Or, To Buy or Not To Buy</a:t>
+            </a:r>
+          </a:p>
+        </p:txBody>
+      </p:sp>
+      <p:sp>
+        <p:nvSpPr>
+          <p:cNvPr id="4" name="Subtitle 2">
+            <a:extLst>
+              <a:ext uri="{FF2B5EF4-FFF2-40B4-BE49-F238E27FC236}">
+                <a16:creationId xmlns:a16="http://schemas.microsoft.com/office/drawing/2014/main" id="{8B3C490A-6C40-4991-A10E-8BE75CAB8345}"/>
+              </a:ext>
+            </a:extLst>
+          </p:cNvPr>
+          <p:cNvSpPr txBox="1">
+            <a:spLocks/>
+          </p:cNvSpPr>
+          <p:nvPr/>
+        </p:nvSpPr>
+        <p:spPr>
+          <a:xfrm>
+            <a:off x="1528116" y="4246880"/>
+            <a:ext cx="9144000" cy="2217764"/>
+          </a:xfrm>
+          <a:prstGeom prst="rect">
+            <a:avLst/>
+          </a:prstGeom>
+        </p:spPr>
+        <p:txBody>
+          <a:bodyPr vert="horz" lIns="91440" tIns="45720" rIns="91440" bIns="45720" rtlCol="0">
+            <a:noAutofit/>
+          </a:bodyPr>
+          <a:lstStyle>
+            <a:lvl1pPr marL="0" indent="0" algn="ctr" defTabSz="914400" rtl="0" eaLnBrk="1" latinLnBrk="0" hangingPunct="1">
+              <a:lnSpc>
+                <a:spcPct val="90000"/>
+              </a:lnSpc>
+              <a:spcBef>
+                <a:spcPts val="1000"/>
+              </a:spcBef>
+              <a:buFont typeface="Arial" panose="020B0604020202020204" pitchFamily="34" charset="0"/>
+              <a:buNone/>
+              <a:defRPr sz="2400" kern="1200">
+                <a:solidFill>
+                  <a:schemeClr val="tx1"/>
+                </a:solidFill>
+                <a:latin typeface="+mn-lt"/>
+                <a:ea typeface="+mn-ea"/>
+                <a:cs typeface="+mn-cs"/>
+              </a:defRPr>
+            </a:lvl1pPr>
+            <a:lvl2pPr marL="457200" indent="0" algn="ctr" defTabSz="914400" rtl="0" eaLnBrk="1" latinLnBrk="0" hangingPunct="1">
+              <a:lnSpc>
+                <a:spcPct val="90000"/>
+              </a:lnSpc>
+              <a:spcBef>
+                <a:spcPts val="500"/>
+              </a:spcBef>
+              <a:buFont typeface="Arial" panose="020B0604020202020204" pitchFamily="34" charset="0"/>
+              <a:buNone/>
+              <a:defRPr sz="2000" kern="1200">
+                <a:solidFill>
+                  <a:schemeClr val="tx1"/>
+                </a:solidFill>
+                <a:latin typeface="+mn-lt"/>
+                <a:ea typeface="+mn-ea"/>
+                <a:cs typeface="+mn-cs"/>
+              </a:defRPr>
+            </a:lvl2pPr>
+            <a:lvl3pPr marL="914400" indent="0" algn="ctr" defTabSz="914400" rtl="0" eaLnBrk="1" latinLnBrk="0" hangingPunct="1">
+              <a:lnSpc>
+                <a:spcPct val="90000"/>
+              </a:lnSpc>
+              <a:spcBef>
+                <a:spcPts val="500"/>
+              </a:spcBef>
+              <a:buFont typeface="Arial" panose="020B0604020202020204" pitchFamily="34" charset="0"/>
+              <a:buNone/>
+              <a:defRPr sz="1800" kern="1200">
+                <a:solidFill>
+                  <a:schemeClr val="tx1"/>
+                </a:solidFill>
+                <a:latin typeface="+mn-lt"/>
+                <a:ea typeface="+mn-ea"/>
+                <a:cs typeface="+mn-cs"/>
+              </a:defRPr>
+            </a:lvl3pPr>
+            <a:lvl4pPr marL="1371600" indent="0" algn="ctr" defTabSz="914400" rtl="0" eaLnBrk="1" latinLnBrk="0" hangingPunct="1">
+              <a:lnSpc>
+                <a:spcPct val="90000"/>
+              </a:lnSpc>
+              <a:spcBef>
+                <a:spcPts val="500"/>
+              </a:spcBef>
+              <a:buFont typeface="Arial" panose="020B0604020202020204" pitchFamily="34" charset="0"/>
+              <a:buNone/>
+              <a:defRPr sz="1600" kern="1200">
+                <a:solidFill>
+                  <a:schemeClr val="tx1"/>
+                </a:solidFill>
+                <a:latin typeface="+mn-lt"/>
+                <a:ea typeface="+mn-ea"/>
+                <a:cs typeface="+mn-cs"/>
+              </a:defRPr>
+            </a:lvl4pPr>
+            <a:lvl5pPr marL="1828800" indent="0" algn="ctr" defTabSz="914400" rtl="0" eaLnBrk="1" latinLnBrk="0" hangingPunct="1">
+              <a:lnSpc>
+                <a:spcPct val="90000"/>
+              </a:lnSpc>
+              <a:spcBef>
+                <a:spcPts val="500"/>
+              </a:spcBef>
+              <a:buFont typeface="Arial" panose="020B0604020202020204" pitchFamily="34" charset="0"/>
+              <a:buNone/>
+              <a:defRPr sz="1600" kern="1200">
+                <a:solidFill>
+                  <a:schemeClr val="tx1"/>
+                </a:solidFill>
+                <a:latin typeface="+mn-lt"/>
+                <a:ea typeface="+mn-ea"/>
+                <a:cs typeface="+mn-cs"/>
+              </a:defRPr>
+            </a:lvl5pPr>
+            <a:lvl6pPr marL="2286000" indent="0" algn="ctr" defTabSz="914400" rtl="0" eaLnBrk="1" latinLnBrk="0" hangingPunct="1">
+              <a:lnSpc>
+                <a:spcPct val="90000"/>
+              </a:lnSpc>
+              <a:spcBef>
+                <a:spcPts val="500"/>
+              </a:spcBef>
+              <a:buFont typeface="Arial" panose="020B0604020202020204" pitchFamily="34" charset="0"/>
+              <a:buNone/>
+              <a:defRPr sz="1600" kern="1200">
+                <a:solidFill>
+                  <a:schemeClr val="tx1"/>
+                </a:solidFill>
+                <a:latin typeface="+mn-lt"/>
+                <a:ea typeface="+mn-ea"/>
+                <a:cs typeface="+mn-cs"/>
+              </a:defRPr>
+            </a:lvl6pPr>
+            <a:lvl7pPr marL="2743200" indent="0" algn="ctr" defTabSz="914400" rtl="0" eaLnBrk="1" latinLnBrk="0" hangingPunct="1">
+              <a:lnSpc>
+                <a:spcPct val="90000"/>
+              </a:lnSpc>
+              <a:spcBef>
+                <a:spcPts val="500"/>
+              </a:spcBef>
+              <a:buFont typeface="Arial" panose="020B0604020202020204" pitchFamily="34" charset="0"/>
+              <a:buNone/>
+              <a:defRPr sz="1600" kern="1200">
+                <a:solidFill>
+                  <a:schemeClr val="tx1"/>
+                </a:solidFill>
+                <a:latin typeface="+mn-lt"/>
+                <a:ea typeface="+mn-ea"/>
+                <a:cs typeface="+mn-cs"/>
+              </a:defRPr>
+            </a:lvl7pPr>
+            <a:lvl8pPr marL="3200400" indent="0" algn="ctr" defTabSz="914400" rtl="0" eaLnBrk="1" latinLnBrk="0" hangingPunct="1">
+              <a:lnSpc>
+                <a:spcPct val="90000"/>
+              </a:lnSpc>
+              <a:spcBef>
+                <a:spcPts val="500"/>
+              </a:spcBef>
+              <a:buFont typeface="Arial" panose="020B0604020202020204" pitchFamily="34" charset="0"/>
+              <a:buNone/>
+              <a:defRPr sz="1600" kern="1200">
+                <a:solidFill>
+                  <a:schemeClr val="tx1"/>
+                </a:solidFill>
+                <a:latin typeface="+mn-lt"/>
+                <a:ea typeface="+mn-ea"/>
+                <a:cs typeface="+mn-cs"/>
+              </a:defRPr>
+            </a:lvl8pPr>
+            <a:lvl9pPr marL="3657600" indent="0" algn="ctr" defTabSz="914400" rtl="0" eaLnBrk="1" latinLnBrk="0" hangingPunct="1">
+              <a:lnSpc>
+                <a:spcPct val="90000"/>
+              </a:lnSpc>
+              <a:spcBef>
+                <a:spcPts val="500"/>
+              </a:spcBef>
+              <a:buFont typeface="Arial" panose="020B0604020202020204" pitchFamily="34" charset="0"/>
+              <a:buNone/>
+              <a:defRPr sz="1600" kern="1200">
+                <a:solidFill>
+                  <a:schemeClr val="tx1"/>
+                </a:solidFill>
+                <a:latin typeface="+mn-lt"/>
+                <a:ea typeface="+mn-ea"/>
+                <a:cs typeface="+mn-cs"/>
+              </a:defRPr>
+            </a:lvl9pPr>
+          </a:lstStyle>
+          <a:p>
+            <a:r>
+              <a:rPr lang="en-US" dirty="0"/>
+              <a:t>Shweta Banerjee</a:t>
+            </a:r>
+          </a:p>
+          <a:p>
+            <a:r>
+              <a:rPr lang="en-US" dirty="0" err="1"/>
+              <a:t>Yedidya</a:t>
+            </a:r>
+            <a:r>
+              <a:rPr lang="en-US" dirty="0"/>
+              <a:t> </a:t>
+            </a:r>
+            <a:r>
+              <a:rPr lang="en-US" dirty="0" err="1"/>
+              <a:t>Erque</a:t>
+            </a:r>
+            <a:endParaRPr lang="en-US" dirty="0"/>
+          </a:p>
+          <a:p>
+            <a:r>
+              <a:rPr lang="en-US" dirty="0"/>
+              <a:t>Bowie Hand</a:t>
+            </a:r>
+          </a:p>
+          <a:p>
+            <a:r>
+              <a:rPr lang="en-US" dirty="0"/>
+              <a:t>Jessica Serna</a:t>
+            </a:r>
+          </a:p>
+          <a:p>
+            <a:r>
+              <a:rPr lang="en-US" dirty="0"/>
+              <a:t>Lu</a:t>
             </a:r>
           </a:p>
         </p:txBody>
@@ -3443,6 +3712,72 @@
           <p:cNvPr id="3" name="Picture 2">
             <a:extLst>
               <a:ext uri="{FF2B5EF4-FFF2-40B4-BE49-F238E27FC236}">
+                <a16:creationId xmlns:a16="http://schemas.microsoft.com/office/drawing/2014/main" id="{439731A3-5796-4D16-8F0B-A8E6E2B8E3F6}"/>
+              </a:ext>
+            </a:extLst>
+          </p:cNvPr>
+          <p:cNvPicPr>
+            <a:picLocks noChangeAspect="1"/>
+          </p:cNvPicPr>
+          <p:nvPr/>
+        </p:nvPicPr>
+        <p:blipFill>
+          <a:blip r:embed="rId2">
+            <a:extLst>
+              <a:ext uri="{28A0092B-C50C-407E-A947-70E740481C1C}">
+                <a14:useLocalDpi xmlns:a14="http://schemas.microsoft.com/office/drawing/2010/main" val="0"/>
+              </a:ext>
+            </a:extLst>
+          </a:blip>
+          <a:stretch>
+            <a:fillRect/>
+          </a:stretch>
+        </p:blipFill>
+        <p:spPr>
+          <a:xfrm>
+            <a:off x="3657600" y="0"/>
+            <a:ext cx="4876800" cy="6858000"/>
+          </a:xfrm>
+          <a:prstGeom prst="rect">
+            <a:avLst/>
+          </a:prstGeom>
+        </p:spPr>
+      </p:pic>
+    </p:spTree>
+    <p:extLst>
+      <p:ext uri="{BB962C8B-B14F-4D97-AF65-F5344CB8AC3E}">
+        <p14:creationId xmlns:p14="http://schemas.microsoft.com/office/powerpoint/2010/main" val="844046032"/>
+      </p:ext>
+    </p:extLst>
+  </p:cSld>
+  <p:clrMapOvr>
+    <a:masterClrMapping/>
+  </p:clrMapOvr>
+</p:sld>
+</file>
+
+<file path=ppt/slides/slide11.xml><?xml version="1.0" encoding="utf-8"?>
+<p:sld xmlns:a="http://schemas.openxmlformats.org/drawingml/2006/main" xmlns:r="http://schemas.openxmlformats.org/officeDocument/2006/relationships" xmlns:p="http://schemas.openxmlformats.org/presentationml/2006/main">
+  <p:cSld>
+    <p:spTree>
+      <p:nvGrpSpPr>
+        <p:cNvPr id="1" name=""/>
+        <p:cNvGrpSpPr/>
+        <p:nvPr/>
+      </p:nvGrpSpPr>
+      <p:grpSpPr>
+        <a:xfrm>
+          <a:off x="0" y="0"/>
+          <a:ext cx="0" cy="0"/>
+          <a:chOff x="0" y="0"/>
+          <a:chExt cx="0" cy="0"/>
+        </a:xfrm>
+      </p:grpSpPr>
+      <p:pic>
+        <p:nvPicPr>
+          <p:cNvPr id="3" name="Picture 2">
+            <a:extLst>
+              <a:ext uri="{FF2B5EF4-FFF2-40B4-BE49-F238E27FC236}">
                 <a16:creationId xmlns:a16="http://schemas.microsoft.com/office/drawing/2014/main" id="{EBBF7153-2D90-4DE9-A963-6EF8BB667530}"/>
               </a:ext>
             </a:extLst>
@@ -3487,89 +3822,6 @@
 </p:sld>
 </file>
 
-<file path=ppt/slides/slide11.xml><?xml version="1.0" encoding="utf-8"?>
-<p:sld xmlns:a="http://schemas.openxmlformats.org/drawingml/2006/main" xmlns:r="http://schemas.openxmlformats.org/officeDocument/2006/relationships" xmlns:p="http://schemas.openxmlformats.org/presentationml/2006/main">
-  <p:cSld>
-    <p:spTree>
-      <p:nvGrpSpPr>
-        <p:cNvPr id="1" name=""/>
-        <p:cNvGrpSpPr/>
-        <p:nvPr/>
-      </p:nvGrpSpPr>
-      <p:grpSpPr>
-        <a:xfrm>
-          <a:off x="0" y="0"/>
-          <a:ext cx="0" cy="0"/>
-          <a:chOff x="0" y="0"/>
-          <a:chExt cx="0" cy="0"/>
-        </a:xfrm>
-      </p:grpSpPr>
-      <p:sp>
-        <p:nvSpPr>
-          <p:cNvPr id="2" name="Title 1">
-            <a:extLst>
-              <a:ext uri="{FF2B5EF4-FFF2-40B4-BE49-F238E27FC236}">
-                <a16:creationId xmlns:a16="http://schemas.microsoft.com/office/drawing/2014/main" id="{21B43DC1-6DFA-4A53-AEBF-251623A7D3C8}"/>
-              </a:ext>
-            </a:extLst>
-          </p:cNvPr>
-          <p:cNvSpPr>
-            <a:spLocks noGrp="1"/>
-          </p:cNvSpPr>
-          <p:nvPr>
-            <p:ph type="title"/>
-          </p:nvPr>
-        </p:nvSpPr>
-        <p:spPr/>
-        <p:txBody>
-          <a:bodyPr/>
-          <a:lstStyle/>
-          <a:p>
-            <a:r>
-              <a:rPr lang="en-US" dirty="0"/>
-              <a:t>Homeownership Rates</a:t>
-            </a:r>
-          </a:p>
-        </p:txBody>
-      </p:sp>
-      <p:sp>
-        <p:nvSpPr>
-          <p:cNvPr id="3" name="Text Placeholder 2">
-            <a:extLst>
-              <a:ext uri="{FF2B5EF4-FFF2-40B4-BE49-F238E27FC236}">
-                <a16:creationId xmlns:a16="http://schemas.microsoft.com/office/drawing/2014/main" id="{0483BA08-1842-49E3-A057-AE5850564CC6}"/>
-              </a:ext>
-            </a:extLst>
-          </p:cNvPr>
-          <p:cNvSpPr>
-            <a:spLocks noGrp="1"/>
-          </p:cNvSpPr>
-          <p:nvPr>
-            <p:ph type="body" idx="1"/>
-          </p:nvPr>
-        </p:nvSpPr>
-        <p:spPr/>
-        <p:txBody>
-          <a:bodyPr/>
-          <a:lstStyle/>
-          <a:p>
-            <a:endParaRPr lang="en-US"/>
-          </a:p>
-        </p:txBody>
-      </p:sp>
-    </p:spTree>
-    <p:extLst>
-      <p:ext uri="{BB962C8B-B14F-4D97-AF65-F5344CB8AC3E}">
-        <p14:creationId xmlns:p14="http://schemas.microsoft.com/office/powerpoint/2010/main" val="2661058186"/>
-      </p:ext>
-    </p:extLst>
-  </p:cSld>
-  <p:clrMapOvr>
-    <a:masterClrMapping/>
-  </p:clrMapOvr>
-</p:sld>
-</file>
-
 <file path=ppt/slides/slide12.xml><?xml version="1.0" encoding="utf-8"?>
 <p:sld xmlns:a="http://schemas.openxmlformats.org/drawingml/2006/main" xmlns:r="http://schemas.openxmlformats.org/officeDocument/2006/relationships" xmlns:p="http://schemas.openxmlformats.org/presentationml/2006/main">
   <p:cSld>
@@ -3587,46 +3839,63 @@
           <a:chExt cx="0" cy="0"/>
         </a:xfrm>
       </p:grpSpPr>
-      <p:pic>
-        <p:nvPicPr>
-          <p:cNvPr id="3" name="Picture 2">
-            <a:extLst>
-              <a:ext uri="{FF2B5EF4-FFF2-40B4-BE49-F238E27FC236}">
-                <a16:creationId xmlns:a16="http://schemas.microsoft.com/office/drawing/2014/main" id="{2D7552BE-B5D9-4720-9212-B084606A3ED8}"/>
-              </a:ext>
-            </a:extLst>
-          </p:cNvPr>
-          <p:cNvPicPr>
-            <a:picLocks noChangeAspect="1"/>
-          </p:cNvPicPr>
-          <p:nvPr/>
-        </p:nvPicPr>
-        <p:blipFill>
-          <a:blip r:embed="rId2">
-            <a:extLst>
-              <a:ext uri="{28A0092B-C50C-407E-A947-70E740481C1C}">
-                <a14:useLocalDpi xmlns:a14="http://schemas.microsoft.com/office/drawing/2010/main" val="0"/>
-              </a:ext>
-            </a:extLst>
-          </a:blip>
-          <a:stretch>
-            <a:fillRect/>
-          </a:stretch>
-        </p:blipFill>
-        <p:spPr>
-          <a:xfrm>
-            <a:off x="0" y="0"/>
-            <a:ext cx="12192000" cy="6858000"/>
-          </a:xfrm>
-          <a:prstGeom prst="rect">
-            <a:avLst/>
-          </a:prstGeom>
-        </p:spPr>
-      </p:pic>
+      <p:sp>
+        <p:nvSpPr>
+          <p:cNvPr id="2" name="Title 1">
+            <a:extLst>
+              <a:ext uri="{FF2B5EF4-FFF2-40B4-BE49-F238E27FC236}">
+                <a16:creationId xmlns:a16="http://schemas.microsoft.com/office/drawing/2014/main" id="{21B43DC1-6DFA-4A53-AEBF-251623A7D3C8}"/>
+              </a:ext>
+            </a:extLst>
+          </p:cNvPr>
+          <p:cNvSpPr>
+            <a:spLocks noGrp="1"/>
+          </p:cNvSpPr>
+          <p:nvPr>
+            <p:ph type="title"/>
+          </p:nvPr>
+        </p:nvSpPr>
+        <p:spPr/>
+        <p:txBody>
+          <a:bodyPr/>
+          <a:lstStyle/>
+          <a:p>
+            <a:r>
+              <a:rPr lang="en-US" dirty="0"/>
+              <a:t>Homeownership Rates</a:t>
+            </a:r>
+          </a:p>
+        </p:txBody>
+      </p:sp>
+      <p:sp>
+        <p:nvSpPr>
+          <p:cNvPr id="3" name="Text Placeholder 2">
+            <a:extLst>
+              <a:ext uri="{FF2B5EF4-FFF2-40B4-BE49-F238E27FC236}">
+                <a16:creationId xmlns:a16="http://schemas.microsoft.com/office/drawing/2014/main" id="{0483BA08-1842-49E3-A057-AE5850564CC6}"/>
+              </a:ext>
+            </a:extLst>
+          </p:cNvPr>
+          <p:cNvSpPr>
+            <a:spLocks noGrp="1"/>
+          </p:cNvSpPr>
+          <p:nvPr>
+            <p:ph type="body" idx="1"/>
+          </p:nvPr>
+        </p:nvSpPr>
+        <p:spPr/>
+        <p:txBody>
+          <a:bodyPr/>
+          <a:lstStyle/>
+          <a:p>
+            <a:endParaRPr lang="en-US"/>
+          </a:p>
+        </p:txBody>
+      </p:sp>
     </p:spTree>
     <p:extLst>
       <p:ext uri="{BB962C8B-B14F-4D97-AF65-F5344CB8AC3E}">
-        <p14:creationId xmlns:p14="http://schemas.microsoft.com/office/powerpoint/2010/main" val="1586107502"/>
+        <p14:creationId xmlns:p14="http://schemas.microsoft.com/office/powerpoint/2010/main" val="2661058186"/>
       </p:ext>
     </p:extLst>
   </p:cSld>
@@ -3658,7 +3927,7 @@
           <p:cNvPr id="3" name="Picture 2">
             <a:extLst>
               <a:ext uri="{FF2B5EF4-FFF2-40B4-BE49-F238E27FC236}">
-                <a16:creationId xmlns:a16="http://schemas.microsoft.com/office/drawing/2014/main" id="{BC211292-2FFE-4923-B256-1DC45F8A6B98}"/>
+                <a16:creationId xmlns:a16="http://schemas.microsoft.com/office/drawing/2014/main" id="{2D7552BE-B5D9-4720-9212-B084606A3ED8}"/>
               </a:ext>
             </a:extLst>
           </p:cNvPr>
@@ -3692,7 +3961,7 @@
     </p:spTree>
     <p:extLst>
       <p:ext uri="{BB962C8B-B14F-4D97-AF65-F5344CB8AC3E}">
-        <p14:creationId xmlns:p14="http://schemas.microsoft.com/office/powerpoint/2010/main" val="3422937280"/>
+        <p14:creationId xmlns:p14="http://schemas.microsoft.com/office/powerpoint/2010/main" val="1586107502"/>
       </p:ext>
     </p:extLst>
   </p:cSld>
@@ -3724,6 +3993,72 @@
           <p:cNvPr id="3" name="Picture 2">
             <a:extLst>
               <a:ext uri="{FF2B5EF4-FFF2-40B4-BE49-F238E27FC236}">
+                <a16:creationId xmlns:a16="http://schemas.microsoft.com/office/drawing/2014/main" id="{BC211292-2FFE-4923-B256-1DC45F8A6B98}"/>
+              </a:ext>
+            </a:extLst>
+          </p:cNvPr>
+          <p:cNvPicPr>
+            <a:picLocks noChangeAspect="1"/>
+          </p:cNvPicPr>
+          <p:nvPr/>
+        </p:nvPicPr>
+        <p:blipFill>
+          <a:blip r:embed="rId2">
+            <a:extLst>
+              <a:ext uri="{28A0092B-C50C-407E-A947-70E740481C1C}">
+                <a14:useLocalDpi xmlns:a14="http://schemas.microsoft.com/office/drawing/2010/main" val="0"/>
+              </a:ext>
+            </a:extLst>
+          </a:blip>
+          <a:stretch>
+            <a:fillRect/>
+          </a:stretch>
+        </p:blipFill>
+        <p:spPr>
+          <a:xfrm>
+            <a:off x="0" y="0"/>
+            <a:ext cx="12192000" cy="6858000"/>
+          </a:xfrm>
+          <a:prstGeom prst="rect">
+            <a:avLst/>
+          </a:prstGeom>
+        </p:spPr>
+      </p:pic>
+    </p:spTree>
+    <p:extLst>
+      <p:ext uri="{BB962C8B-B14F-4D97-AF65-F5344CB8AC3E}">
+        <p14:creationId xmlns:p14="http://schemas.microsoft.com/office/powerpoint/2010/main" val="3422937280"/>
+      </p:ext>
+    </p:extLst>
+  </p:cSld>
+  <p:clrMapOvr>
+    <a:masterClrMapping/>
+  </p:clrMapOvr>
+</p:sld>
+</file>
+
+<file path=ppt/slides/slide15.xml><?xml version="1.0" encoding="utf-8"?>
+<p:sld xmlns:a="http://schemas.openxmlformats.org/drawingml/2006/main" xmlns:r="http://schemas.openxmlformats.org/officeDocument/2006/relationships" xmlns:p="http://schemas.openxmlformats.org/presentationml/2006/main">
+  <p:cSld>
+    <p:spTree>
+      <p:nvGrpSpPr>
+        <p:cNvPr id="1" name=""/>
+        <p:cNvGrpSpPr/>
+        <p:nvPr/>
+      </p:nvGrpSpPr>
+      <p:grpSpPr>
+        <a:xfrm>
+          <a:off x="0" y="0"/>
+          <a:ext cx="0" cy="0"/>
+          <a:chOff x="0" y="0"/>
+          <a:chExt cx="0" cy="0"/>
+        </a:xfrm>
+      </p:grpSpPr>
+      <p:pic>
+        <p:nvPicPr>
+          <p:cNvPr id="3" name="Picture 2">
+            <a:extLst>
+              <a:ext uri="{FF2B5EF4-FFF2-40B4-BE49-F238E27FC236}">
                 <a16:creationId xmlns:a16="http://schemas.microsoft.com/office/drawing/2014/main" id="{8462B92E-89D4-4670-98DA-87961F31035F}"/>
               </a:ext>
             </a:extLst>
@@ -3768,89 +4103,6 @@
 </p:sld>
 </file>
 
-<file path=ppt/slides/slide15.xml><?xml version="1.0" encoding="utf-8"?>
-<p:sld xmlns:a="http://schemas.openxmlformats.org/drawingml/2006/main" xmlns:r="http://schemas.openxmlformats.org/officeDocument/2006/relationships" xmlns:p="http://schemas.openxmlformats.org/presentationml/2006/main">
-  <p:cSld>
-    <p:spTree>
-      <p:nvGrpSpPr>
-        <p:cNvPr id="1" name=""/>
-        <p:cNvGrpSpPr/>
-        <p:nvPr/>
-      </p:nvGrpSpPr>
-      <p:grpSpPr>
-        <a:xfrm>
-          <a:off x="0" y="0"/>
-          <a:ext cx="0" cy="0"/>
-          <a:chOff x="0" y="0"/>
-          <a:chExt cx="0" cy="0"/>
-        </a:xfrm>
-      </p:grpSpPr>
-      <p:sp>
-        <p:nvSpPr>
-          <p:cNvPr id="2" name="Title 1">
-            <a:extLst>
-              <a:ext uri="{FF2B5EF4-FFF2-40B4-BE49-F238E27FC236}">
-                <a16:creationId xmlns:a16="http://schemas.microsoft.com/office/drawing/2014/main" id="{4E6438AB-96CA-4CF7-9F7D-87E1A8160C28}"/>
-              </a:ext>
-            </a:extLst>
-          </p:cNvPr>
-          <p:cNvSpPr>
-            <a:spLocks noGrp="1"/>
-          </p:cNvSpPr>
-          <p:nvPr>
-            <p:ph type="title"/>
-          </p:nvPr>
-        </p:nvSpPr>
-        <p:spPr/>
-        <p:txBody>
-          <a:bodyPr/>
-          <a:lstStyle/>
-          <a:p>
-            <a:r>
-              <a:rPr lang="en-US" dirty="0"/>
-              <a:t>Vacancy Rates</a:t>
-            </a:r>
-          </a:p>
-        </p:txBody>
-      </p:sp>
-      <p:sp>
-        <p:nvSpPr>
-          <p:cNvPr id="3" name="Text Placeholder 2">
-            <a:extLst>
-              <a:ext uri="{FF2B5EF4-FFF2-40B4-BE49-F238E27FC236}">
-                <a16:creationId xmlns:a16="http://schemas.microsoft.com/office/drawing/2014/main" id="{00773555-6AFE-4B09-BE13-D9A9E21F661B}"/>
-              </a:ext>
-            </a:extLst>
-          </p:cNvPr>
-          <p:cNvSpPr>
-            <a:spLocks noGrp="1"/>
-          </p:cNvSpPr>
-          <p:nvPr>
-            <p:ph type="body" idx="1"/>
-          </p:nvPr>
-        </p:nvSpPr>
-        <p:spPr/>
-        <p:txBody>
-          <a:bodyPr/>
-          <a:lstStyle/>
-          <a:p>
-            <a:endParaRPr lang="en-US"/>
-          </a:p>
-        </p:txBody>
-      </p:sp>
-    </p:spTree>
-    <p:extLst>
-      <p:ext uri="{BB962C8B-B14F-4D97-AF65-F5344CB8AC3E}">
-        <p14:creationId xmlns:p14="http://schemas.microsoft.com/office/powerpoint/2010/main" val="3046059462"/>
-      </p:ext>
-    </p:extLst>
-  </p:cSld>
-  <p:clrMapOvr>
-    <a:masterClrMapping/>
-  </p:clrMapOvr>
-</p:sld>
-</file>
-
 <file path=ppt/slides/slide16.xml><?xml version="1.0" encoding="utf-8"?>
 <p:sld xmlns:a="http://schemas.openxmlformats.org/drawingml/2006/main" xmlns:r="http://schemas.openxmlformats.org/officeDocument/2006/relationships" xmlns:p="http://schemas.openxmlformats.org/presentationml/2006/main">
   <p:cSld>
@@ -3868,46 +4120,63 @@
           <a:chExt cx="0" cy="0"/>
         </a:xfrm>
       </p:grpSpPr>
-      <p:pic>
-        <p:nvPicPr>
-          <p:cNvPr id="3" name="Picture 2">
-            <a:extLst>
-              <a:ext uri="{FF2B5EF4-FFF2-40B4-BE49-F238E27FC236}">
-                <a16:creationId xmlns:a16="http://schemas.microsoft.com/office/drawing/2014/main" id="{BBE490F7-C1CD-412E-AAA3-C513304205C1}"/>
-              </a:ext>
-            </a:extLst>
-          </p:cNvPr>
-          <p:cNvPicPr>
-            <a:picLocks noChangeAspect="1"/>
-          </p:cNvPicPr>
-          <p:nvPr/>
-        </p:nvPicPr>
-        <p:blipFill>
-          <a:blip r:embed="rId2">
-            <a:extLst>
-              <a:ext uri="{28A0092B-C50C-407E-A947-70E740481C1C}">
-                <a14:useLocalDpi xmlns:a14="http://schemas.microsoft.com/office/drawing/2010/main" val="0"/>
-              </a:ext>
-            </a:extLst>
-          </a:blip>
-          <a:stretch>
-            <a:fillRect/>
-          </a:stretch>
-        </p:blipFill>
-        <p:spPr>
-          <a:xfrm>
-            <a:off x="0" y="0"/>
-            <a:ext cx="12192000" cy="6858000"/>
-          </a:xfrm>
-          <a:prstGeom prst="rect">
-            <a:avLst/>
-          </a:prstGeom>
-        </p:spPr>
-      </p:pic>
+      <p:sp>
+        <p:nvSpPr>
+          <p:cNvPr id="2" name="Title 1">
+            <a:extLst>
+              <a:ext uri="{FF2B5EF4-FFF2-40B4-BE49-F238E27FC236}">
+                <a16:creationId xmlns:a16="http://schemas.microsoft.com/office/drawing/2014/main" id="{4E6438AB-96CA-4CF7-9F7D-87E1A8160C28}"/>
+              </a:ext>
+            </a:extLst>
+          </p:cNvPr>
+          <p:cNvSpPr>
+            <a:spLocks noGrp="1"/>
+          </p:cNvSpPr>
+          <p:nvPr>
+            <p:ph type="title"/>
+          </p:nvPr>
+        </p:nvSpPr>
+        <p:spPr/>
+        <p:txBody>
+          <a:bodyPr/>
+          <a:lstStyle/>
+          <a:p>
+            <a:r>
+              <a:rPr lang="en-US" dirty="0"/>
+              <a:t>Vacancy Rates</a:t>
+            </a:r>
+          </a:p>
+        </p:txBody>
+      </p:sp>
+      <p:sp>
+        <p:nvSpPr>
+          <p:cNvPr id="3" name="Text Placeholder 2">
+            <a:extLst>
+              <a:ext uri="{FF2B5EF4-FFF2-40B4-BE49-F238E27FC236}">
+                <a16:creationId xmlns:a16="http://schemas.microsoft.com/office/drawing/2014/main" id="{00773555-6AFE-4B09-BE13-D9A9E21F661B}"/>
+              </a:ext>
+            </a:extLst>
+          </p:cNvPr>
+          <p:cNvSpPr>
+            <a:spLocks noGrp="1"/>
+          </p:cNvSpPr>
+          <p:nvPr>
+            <p:ph type="body" idx="1"/>
+          </p:nvPr>
+        </p:nvSpPr>
+        <p:spPr/>
+        <p:txBody>
+          <a:bodyPr/>
+          <a:lstStyle/>
+          <a:p>
+            <a:endParaRPr lang="en-US"/>
+          </a:p>
+        </p:txBody>
+      </p:sp>
     </p:spTree>
     <p:extLst>
       <p:ext uri="{BB962C8B-B14F-4D97-AF65-F5344CB8AC3E}">
-        <p14:creationId xmlns:p14="http://schemas.microsoft.com/office/powerpoint/2010/main" val="3506243992"/>
+        <p14:creationId xmlns:p14="http://schemas.microsoft.com/office/powerpoint/2010/main" val="3046059462"/>
       </p:ext>
     </p:extLst>
   </p:cSld>
@@ -3939,7 +4208,7 @@
           <p:cNvPr id="3" name="Picture 2">
             <a:extLst>
               <a:ext uri="{FF2B5EF4-FFF2-40B4-BE49-F238E27FC236}">
-                <a16:creationId xmlns:a16="http://schemas.microsoft.com/office/drawing/2014/main" id="{283290F8-8B3D-41D9-9A96-38BA551C2A83}"/>
+                <a16:creationId xmlns:a16="http://schemas.microsoft.com/office/drawing/2014/main" id="{BBE490F7-C1CD-412E-AAA3-C513304205C1}"/>
               </a:ext>
             </a:extLst>
           </p:cNvPr>
@@ -3973,7 +4242,7 @@
     </p:spTree>
     <p:extLst>
       <p:ext uri="{BB962C8B-B14F-4D97-AF65-F5344CB8AC3E}">
-        <p14:creationId xmlns:p14="http://schemas.microsoft.com/office/powerpoint/2010/main" val="2429315519"/>
+        <p14:creationId xmlns:p14="http://schemas.microsoft.com/office/powerpoint/2010/main" val="3506243992"/>
       </p:ext>
     </p:extLst>
   </p:cSld>
@@ -4005,6 +4274,72 @@
           <p:cNvPr id="3" name="Picture 2">
             <a:extLst>
               <a:ext uri="{FF2B5EF4-FFF2-40B4-BE49-F238E27FC236}">
+                <a16:creationId xmlns:a16="http://schemas.microsoft.com/office/drawing/2014/main" id="{283290F8-8B3D-41D9-9A96-38BA551C2A83}"/>
+              </a:ext>
+            </a:extLst>
+          </p:cNvPr>
+          <p:cNvPicPr>
+            <a:picLocks noChangeAspect="1"/>
+          </p:cNvPicPr>
+          <p:nvPr/>
+        </p:nvPicPr>
+        <p:blipFill>
+          <a:blip r:embed="rId2">
+            <a:extLst>
+              <a:ext uri="{28A0092B-C50C-407E-A947-70E740481C1C}">
+                <a14:useLocalDpi xmlns:a14="http://schemas.microsoft.com/office/drawing/2010/main" val="0"/>
+              </a:ext>
+            </a:extLst>
+          </a:blip>
+          <a:stretch>
+            <a:fillRect/>
+          </a:stretch>
+        </p:blipFill>
+        <p:spPr>
+          <a:xfrm>
+            <a:off x="0" y="0"/>
+            <a:ext cx="12192000" cy="6858000"/>
+          </a:xfrm>
+          <a:prstGeom prst="rect">
+            <a:avLst/>
+          </a:prstGeom>
+        </p:spPr>
+      </p:pic>
+    </p:spTree>
+    <p:extLst>
+      <p:ext uri="{BB962C8B-B14F-4D97-AF65-F5344CB8AC3E}">
+        <p14:creationId xmlns:p14="http://schemas.microsoft.com/office/powerpoint/2010/main" val="2429315519"/>
+      </p:ext>
+    </p:extLst>
+  </p:cSld>
+  <p:clrMapOvr>
+    <a:masterClrMapping/>
+  </p:clrMapOvr>
+</p:sld>
+</file>
+
+<file path=ppt/slides/slide19.xml><?xml version="1.0" encoding="utf-8"?>
+<p:sld xmlns:a="http://schemas.openxmlformats.org/drawingml/2006/main" xmlns:r="http://schemas.openxmlformats.org/officeDocument/2006/relationships" xmlns:p="http://schemas.openxmlformats.org/presentationml/2006/main">
+  <p:cSld>
+    <p:spTree>
+      <p:nvGrpSpPr>
+        <p:cNvPr id="1" name=""/>
+        <p:cNvGrpSpPr/>
+        <p:nvPr/>
+      </p:nvGrpSpPr>
+      <p:grpSpPr>
+        <a:xfrm>
+          <a:off x="0" y="0"/>
+          <a:ext cx="0" cy="0"/>
+          <a:chOff x="0" y="0"/>
+          <a:chExt cx="0" cy="0"/>
+        </a:xfrm>
+      </p:grpSpPr>
+      <p:pic>
+        <p:nvPicPr>
+          <p:cNvPr id="3" name="Picture 2">
+            <a:extLst>
+              <a:ext uri="{FF2B5EF4-FFF2-40B4-BE49-F238E27FC236}">
                 <a16:creationId xmlns:a16="http://schemas.microsoft.com/office/drawing/2014/main" id="{71C87531-63CD-4A7A-92F7-0818487A3A6A}"/>
               </a:ext>
             </a:extLst>
@@ -4049,89 +4384,6 @@
 </p:sld>
 </file>
 
-<file path=ppt/slides/slide19.xml><?xml version="1.0" encoding="utf-8"?>
-<p:sld xmlns:a="http://schemas.openxmlformats.org/drawingml/2006/main" xmlns:r="http://schemas.openxmlformats.org/officeDocument/2006/relationships" xmlns:p="http://schemas.openxmlformats.org/presentationml/2006/main">
-  <p:cSld>
-    <p:spTree>
-      <p:nvGrpSpPr>
-        <p:cNvPr id="1" name=""/>
-        <p:cNvGrpSpPr/>
-        <p:nvPr/>
-      </p:nvGrpSpPr>
-      <p:grpSpPr>
-        <a:xfrm>
-          <a:off x="0" y="0"/>
-          <a:ext cx="0" cy="0"/>
-          <a:chOff x="0" y="0"/>
-          <a:chExt cx="0" cy="0"/>
-        </a:xfrm>
-      </p:grpSpPr>
-      <p:sp>
-        <p:nvSpPr>
-          <p:cNvPr id="2" name="Title 1">
-            <a:extLst>
-              <a:ext uri="{FF2B5EF4-FFF2-40B4-BE49-F238E27FC236}">
-                <a16:creationId xmlns:a16="http://schemas.microsoft.com/office/drawing/2014/main" id="{71CEB1E2-0F37-470D-9F09-F14FF00FF356}"/>
-              </a:ext>
-            </a:extLst>
-          </p:cNvPr>
-          <p:cNvSpPr>
-            <a:spLocks noGrp="1"/>
-          </p:cNvSpPr>
-          <p:nvPr>
-            <p:ph type="title"/>
-          </p:nvPr>
-        </p:nvSpPr>
-        <p:spPr/>
-        <p:txBody>
-          <a:bodyPr/>
-          <a:lstStyle/>
-          <a:p>
-            <a:r>
-              <a:rPr lang="en-US" dirty="0"/>
-              <a:t>Affordable Housing Inventory</a:t>
-            </a:r>
-          </a:p>
-        </p:txBody>
-      </p:sp>
-      <p:sp>
-        <p:nvSpPr>
-          <p:cNvPr id="3" name="Text Placeholder 2">
-            <a:extLst>
-              <a:ext uri="{FF2B5EF4-FFF2-40B4-BE49-F238E27FC236}">
-                <a16:creationId xmlns:a16="http://schemas.microsoft.com/office/drawing/2014/main" id="{B630B8AD-0623-4A8B-9988-30FC4EF6D1F8}"/>
-              </a:ext>
-            </a:extLst>
-          </p:cNvPr>
-          <p:cNvSpPr>
-            <a:spLocks noGrp="1"/>
-          </p:cNvSpPr>
-          <p:nvPr>
-            <p:ph type="body" idx="1"/>
-          </p:nvPr>
-        </p:nvSpPr>
-        <p:spPr/>
-        <p:txBody>
-          <a:bodyPr/>
-          <a:lstStyle/>
-          <a:p>
-            <a:endParaRPr lang="en-US"/>
-          </a:p>
-        </p:txBody>
-      </p:sp>
-    </p:spTree>
-    <p:extLst>
-      <p:ext uri="{BB962C8B-B14F-4D97-AF65-F5344CB8AC3E}">
-        <p14:creationId xmlns:p14="http://schemas.microsoft.com/office/powerpoint/2010/main" val="4166668641"/>
-      </p:ext>
-    </p:extLst>
-  </p:cSld>
-  <p:clrMapOvr>
-    <a:masterClrMapping/>
-  </p:clrMapOvr>
-</p:sld>
-</file>
-
 <file path=ppt/slides/slide2.xml><?xml version="1.0" encoding="utf-8"?>
 <p:sld xmlns:a="http://schemas.openxmlformats.org/drawingml/2006/main" xmlns:r="http://schemas.openxmlformats.org/officeDocument/2006/relationships" xmlns:p="http://schemas.openxmlformats.org/presentationml/2006/main">
   <p:cSld>
@@ -4172,7 +4424,7 @@
           <a:p>
             <a:r>
               <a:rPr lang="en-US" dirty="0"/>
-              <a:t>Bubble Definition per Investopedia</a:t>
+              <a:t>Approach</a:t>
             </a:r>
           </a:p>
         </p:txBody>
@@ -4201,72 +4453,60 @@
         </p:spPr>
         <p:txBody>
           <a:bodyPr>
-            <a:normAutofit fontScale="92500" lnSpcReduction="10000"/>
+            <a:normAutofit/>
           </a:bodyPr>
           <a:lstStyle/>
           <a:p>
             <a:r>
               <a:rPr lang="en-US" sz="2400" dirty="0"/>
-              <a:t>A </a:t>
-            </a:r>
-            <a:r>
-              <a:rPr lang="en-US" sz="2400" dirty="0">
-                <a:hlinkClick r:id="rId2"/>
-              </a:rPr>
-              <a:t>bubble</a:t>
-            </a:r>
+              <a:t>Define “Market Bubble”</a:t>
+            </a:r>
+          </a:p>
+          <a:p>
             <a:r>
               <a:rPr lang="en-US" sz="2400" dirty="0"/>
-              <a:t> is a type of investing phenomenon that demonstrates the most basic type of "emotional investing." A bubble occurs when investors put so much demand on a asset that they drive the price beyond any accurate or rational reflection of its actual worth. In the case of a stock, the actual worth would ideally be determined by the performance of the underlying company. Like the soap bubbles a child likes to blow, investing bubbles often appear as though they will rise forever, but since they are not formed from anything substantial, they eventually pop. And when they do, the money that was invested into them dissipates into the wind. </a:t>
+              <a:t>Establish postulates</a:t>
             </a:r>
           </a:p>
           <a:p>
             <a:r>
               <a:rPr lang="en-US" sz="2400" dirty="0"/>
-              <a:t>5 steps to a bubble</a:t>
+              <a:t>Evaluate 2007/2008 housing market crash to confirm or reject postulates based on:</a:t>
             </a:r>
           </a:p>
           <a:p>
             <a:pPr lvl="1"/>
             <a:r>
-              <a:rPr lang="en-US" dirty="0"/>
-              <a:t>Displacement – introduction of a new paradigm (tech, interest rates, etc.)</a:t>
+              <a:rPr lang="en-US" sz="2000" dirty="0"/>
+              <a:t>National indicators – Household Debt, Mortgage Originations, Foreclosures, Delinquency Trends</a:t>
             </a:r>
           </a:p>
           <a:p>
             <a:pPr lvl="1"/>
             <a:r>
-              <a:rPr lang="en-US" dirty="0"/>
-              <a:t>Boom – large scale growth, i.e. ‘fear of missing out.’</a:t>
-            </a:r>
-          </a:p>
-          <a:p>
-            <a:pPr lvl="1"/>
-            <a:r>
-              <a:rPr lang="en-US" dirty="0"/>
-              <a:t>Euphoria – buy regardless of price</a:t>
-            </a:r>
-          </a:p>
-          <a:p>
-            <a:pPr lvl="1"/>
-            <a:r>
-              <a:rPr lang="en-US" dirty="0"/>
-              <a:t>Profit Taking – institution investors exit the market</a:t>
-            </a:r>
-          </a:p>
-          <a:p>
-            <a:pPr lvl="1"/>
-            <a:r>
-              <a:rPr lang="en-US" dirty="0"/>
-              <a:t>Panic – massive liquidation</a:t>
-            </a:r>
+              <a:rPr lang="en-US" sz="2000" dirty="0"/>
+              <a:t>Metropolitan Statistical Areas (MSA) – Housing Price Index, Homeownership Rates, Vacancy Rates, Affordable Housing</a:t>
+            </a:r>
+            <a:endParaRPr lang="en-US" sz="2400" dirty="0"/>
+          </a:p>
+          <a:p>
+            <a:r>
+              <a:rPr lang="en-US" sz="2400" dirty="0"/>
+              <a:t>Determine cities most impacted by subprime crisis and compare to Austin 2018 environment</a:t>
+            </a:r>
+          </a:p>
+          <a:p>
+            <a:endParaRPr lang="en-US" sz="2400" dirty="0"/>
+          </a:p>
+          <a:p>
+            <a:endParaRPr lang="en-US" sz="2400" dirty="0"/>
           </a:p>
         </p:txBody>
       </p:sp>
     </p:spTree>
     <p:extLst>
       <p:ext uri="{BB962C8B-B14F-4D97-AF65-F5344CB8AC3E}">
-        <p14:creationId xmlns:p14="http://schemas.microsoft.com/office/powerpoint/2010/main" val="2326853286"/>
+        <p14:creationId xmlns:p14="http://schemas.microsoft.com/office/powerpoint/2010/main" val="1038300587"/>
       </p:ext>
     </p:extLst>
   </p:cSld>
@@ -4277,6 +4517,89 @@
 </file>
 
 <file path=ppt/slides/slide20.xml><?xml version="1.0" encoding="utf-8"?>
+<p:sld xmlns:a="http://schemas.openxmlformats.org/drawingml/2006/main" xmlns:r="http://schemas.openxmlformats.org/officeDocument/2006/relationships" xmlns:p="http://schemas.openxmlformats.org/presentationml/2006/main">
+  <p:cSld>
+    <p:spTree>
+      <p:nvGrpSpPr>
+        <p:cNvPr id="1" name=""/>
+        <p:cNvGrpSpPr/>
+        <p:nvPr/>
+      </p:nvGrpSpPr>
+      <p:grpSpPr>
+        <a:xfrm>
+          <a:off x="0" y="0"/>
+          <a:ext cx="0" cy="0"/>
+          <a:chOff x="0" y="0"/>
+          <a:chExt cx="0" cy="0"/>
+        </a:xfrm>
+      </p:grpSpPr>
+      <p:sp>
+        <p:nvSpPr>
+          <p:cNvPr id="2" name="Title 1">
+            <a:extLst>
+              <a:ext uri="{FF2B5EF4-FFF2-40B4-BE49-F238E27FC236}">
+                <a16:creationId xmlns:a16="http://schemas.microsoft.com/office/drawing/2014/main" id="{71CEB1E2-0F37-470D-9F09-F14FF00FF356}"/>
+              </a:ext>
+            </a:extLst>
+          </p:cNvPr>
+          <p:cNvSpPr>
+            <a:spLocks noGrp="1"/>
+          </p:cNvSpPr>
+          <p:nvPr>
+            <p:ph type="title"/>
+          </p:nvPr>
+        </p:nvSpPr>
+        <p:spPr/>
+        <p:txBody>
+          <a:bodyPr/>
+          <a:lstStyle/>
+          <a:p>
+            <a:r>
+              <a:rPr lang="en-US" dirty="0"/>
+              <a:t>Affordable Housing Inventory</a:t>
+            </a:r>
+          </a:p>
+        </p:txBody>
+      </p:sp>
+      <p:sp>
+        <p:nvSpPr>
+          <p:cNvPr id="3" name="Text Placeholder 2">
+            <a:extLst>
+              <a:ext uri="{FF2B5EF4-FFF2-40B4-BE49-F238E27FC236}">
+                <a16:creationId xmlns:a16="http://schemas.microsoft.com/office/drawing/2014/main" id="{B630B8AD-0623-4A8B-9988-30FC4EF6D1F8}"/>
+              </a:ext>
+            </a:extLst>
+          </p:cNvPr>
+          <p:cNvSpPr>
+            <a:spLocks noGrp="1"/>
+          </p:cNvSpPr>
+          <p:nvPr>
+            <p:ph type="body" idx="1"/>
+          </p:nvPr>
+        </p:nvSpPr>
+        <p:spPr/>
+        <p:txBody>
+          <a:bodyPr/>
+          <a:lstStyle/>
+          <a:p>
+            <a:endParaRPr lang="en-US"/>
+          </a:p>
+        </p:txBody>
+      </p:sp>
+    </p:spTree>
+    <p:extLst>
+      <p:ext uri="{BB962C8B-B14F-4D97-AF65-F5344CB8AC3E}">
+        <p14:creationId xmlns:p14="http://schemas.microsoft.com/office/powerpoint/2010/main" val="4166668641"/>
+      </p:ext>
+    </p:extLst>
+  </p:cSld>
+  <p:clrMapOvr>
+    <a:masterClrMapping/>
+  </p:clrMapOvr>
+</p:sld>
+</file>
+
+<file path=ppt/slides/slide21.xml><?xml version="1.0" encoding="utf-8"?>
 <p:sld xmlns:a="http://schemas.openxmlformats.org/drawingml/2006/main" xmlns:r="http://schemas.openxmlformats.org/officeDocument/2006/relationships" xmlns:p="http://schemas.openxmlformats.org/presentationml/2006/main">
   <p:cSld>
     <p:spTree>
@@ -4306,7 +4629,7 @@
 </p:sld>
 </file>
 
-<file path=ppt/slides/slide21.xml><?xml version="1.0" encoding="utf-8"?>
+<file path=ppt/slides/slide22.xml><?xml version="1.0" encoding="utf-8"?>
 <p:sld xmlns:a="http://schemas.openxmlformats.org/drawingml/2006/main" xmlns:r="http://schemas.openxmlformats.org/officeDocument/2006/relationships" xmlns:p="http://schemas.openxmlformats.org/presentationml/2006/main">
   <p:cSld>
     <p:spTree>
@@ -4336,113 +4659,6 @@
 </p:sld>
 </file>
 
-<file path=ppt/slides/slide22.xml><?xml version="1.0" encoding="utf-8"?>
-<p:sld xmlns:a="http://schemas.openxmlformats.org/drawingml/2006/main" xmlns:r="http://schemas.openxmlformats.org/officeDocument/2006/relationships" xmlns:p="http://schemas.openxmlformats.org/presentationml/2006/main">
-  <p:cSld>
-    <p:spTree>
-      <p:nvGrpSpPr>
-        <p:cNvPr id="1" name=""/>
-        <p:cNvGrpSpPr/>
-        <p:nvPr/>
-      </p:nvGrpSpPr>
-      <p:grpSpPr>
-        <a:xfrm>
-          <a:off x="0" y="0"/>
-          <a:ext cx="0" cy="0"/>
-          <a:chOff x="0" y="0"/>
-          <a:chExt cx="0" cy="0"/>
-        </a:xfrm>
-      </p:grpSpPr>
-      <p:sp>
-        <p:nvSpPr>
-          <p:cNvPr id="2" name="Title 1">
-            <a:extLst>
-              <a:ext uri="{FF2B5EF4-FFF2-40B4-BE49-F238E27FC236}">
-                <a16:creationId xmlns:a16="http://schemas.microsoft.com/office/drawing/2014/main" id="{DBEC44FC-34B4-446A-97FD-2821EA882188}"/>
-              </a:ext>
-            </a:extLst>
-          </p:cNvPr>
-          <p:cNvSpPr>
-            <a:spLocks noGrp="1"/>
-          </p:cNvSpPr>
-          <p:nvPr>
-            <p:ph type="title"/>
-          </p:nvPr>
-        </p:nvSpPr>
-        <p:spPr/>
-        <p:txBody>
-          <a:bodyPr/>
-          <a:lstStyle/>
-          <a:p>
-            <a:r>
-              <a:rPr lang="en-US" dirty="0"/>
-              <a:t>Conclusions</a:t>
-            </a:r>
-          </a:p>
-        </p:txBody>
-      </p:sp>
-      <p:sp>
-        <p:nvSpPr>
-          <p:cNvPr id="3" name="Content Placeholder 2">
-            <a:extLst>
-              <a:ext uri="{FF2B5EF4-FFF2-40B4-BE49-F238E27FC236}">
-                <a16:creationId xmlns:a16="http://schemas.microsoft.com/office/drawing/2014/main" id="{386CF659-E75C-4651-8918-40A8978BB7F3}"/>
-              </a:ext>
-            </a:extLst>
-          </p:cNvPr>
-          <p:cNvSpPr>
-            <a:spLocks noGrp="1"/>
-          </p:cNvSpPr>
-          <p:nvPr>
-            <p:ph idx="1"/>
-          </p:nvPr>
-        </p:nvSpPr>
-        <p:spPr/>
-        <p:txBody>
-          <a:bodyPr/>
-          <a:lstStyle/>
-          <a:p>
-            <a:r>
-              <a:rPr lang="en-US" dirty="0"/>
-              <a:t>Based on current data, there are no indicators that suggest Austin is in a housing market bubble.</a:t>
-            </a:r>
-          </a:p>
-          <a:p>
-            <a:pPr marL="0" indent="0">
-              <a:buNone/>
-            </a:pPr>
-            <a:endParaRPr lang="en-US" dirty="0"/>
-          </a:p>
-          <a:p>
-            <a:r>
-              <a:rPr lang="en-US" dirty="0"/>
-              <a:t>Although subprime mortgage crisis of 2007/2008 wrecked the overall US economy, based on the HPI and delinquency data, Austin was only minorly affected.</a:t>
-            </a:r>
-          </a:p>
-          <a:p>
-            <a:r>
-              <a:rPr lang="en-US" dirty="0"/>
-              <a:t>Current national indicators (mortgage rates, household debt, foreclosure rates) shows no signs of a repeat of the 2007/2008 event.</a:t>
-            </a:r>
-          </a:p>
-          <a:p>
-            <a:endParaRPr lang="en-US" dirty="0"/>
-          </a:p>
-        </p:txBody>
-      </p:sp>
-    </p:spTree>
-    <p:extLst>
-      <p:ext uri="{BB962C8B-B14F-4D97-AF65-F5344CB8AC3E}">
-        <p14:creationId xmlns:p14="http://schemas.microsoft.com/office/powerpoint/2010/main" val="4170153595"/>
-      </p:ext>
-    </p:extLst>
-  </p:cSld>
-  <p:clrMapOvr>
-    <a:masterClrMapping/>
-  </p:clrMapOvr>
-</p:sld>
-</file>
-
 <file path=ppt/slides/slide23.xml><?xml version="1.0" encoding="utf-8"?>
 <p:sld xmlns:a="http://schemas.openxmlformats.org/drawingml/2006/main" xmlns:r="http://schemas.openxmlformats.org/officeDocument/2006/relationships" xmlns:p="http://schemas.openxmlformats.org/presentationml/2006/main">
   <p:cSld>
@@ -4465,7 +4681,7 @@
           <p:cNvPr id="2" name="Title 1">
             <a:extLst>
               <a:ext uri="{FF2B5EF4-FFF2-40B4-BE49-F238E27FC236}">
-                <a16:creationId xmlns:a16="http://schemas.microsoft.com/office/drawing/2014/main" id="{7A3BD4D1-02FF-4AEB-ABD4-A2E384C7B83A}"/>
+                <a16:creationId xmlns:a16="http://schemas.microsoft.com/office/drawing/2014/main" id="{27FC7EB1-E3ED-4F2A-A03C-2B27ADFD2808}"/>
               </a:ext>
             </a:extLst>
           </p:cNvPr>
@@ -4483,7 +4699,7 @@
           <a:p>
             <a:r>
               <a:rPr lang="en-US" dirty="0"/>
-              <a:t>Lessons Learned</a:t>
+              <a:t>Postulates of a Market Bubble - Revisited</a:t>
             </a:r>
           </a:p>
         </p:txBody>
@@ -4493,7 +4709,7 @@
           <p:cNvPr id="3" name="Content Placeholder 2">
             <a:extLst>
               <a:ext uri="{FF2B5EF4-FFF2-40B4-BE49-F238E27FC236}">
-                <a16:creationId xmlns:a16="http://schemas.microsoft.com/office/drawing/2014/main" id="{BDD685D4-3B9C-4934-BC8B-C30D8714B1F0}"/>
+                <a16:creationId xmlns:a16="http://schemas.microsoft.com/office/drawing/2014/main" id="{F54E4C33-6016-4709-AC7C-7286CF64AF45}"/>
               </a:ext>
             </a:extLst>
           </p:cNvPr>
@@ -4506,12 +4722,96 @@
         </p:nvSpPr>
         <p:spPr/>
         <p:txBody>
-          <a:bodyPr/>
-          <a:lstStyle/>
-          <a:p>
-            <a:r>
-              <a:rPr lang="en-US" dirty="0"/>
-              <a:t>Data collection is time consuming</a:t>
+          <a:bodyPr>
+            <a:normAutofit fontScale="92500" lnSpcReduction="20000"/>
+          </a:bodyPr>
+          <a:lstStyle/>
+          <a:p>
+            <a:r>
+              <a:rPr lang="en-US" dirty="0"/>
+              <a:t>During expansion</a:t>
+            </a:r>
+          </a:p>
+          <a:p>
+            <a:pPr lvl="1"/>
+            <a:r>
+              <a:rPr lang="en-US" dirty="0"/>
+              <a:t>Housing prices increase - confirmed</a:t>
+            </a:r>
+          </a:p>
+          <a:p>
+            <a:pPr lvl="1"/>
+            <a:r>
+              <a:rPr lang="en-US" dirty="0"/>
+              <a:t>Mortgage rates increase – insufficient data</a:t>
+            </a:r>
+          </a:p>
+          <a:p>
+            <a:pPr lvl="1"/>
+            <a:r>
+              <a:rPr lang="en-US" dirty="0"/>
+              <a:t>Occupancy rates increase and vacancy rates decrease - undetermined</a:t>
+            </a:r>
+          </a:p>
+          <a:p>
+            <a:pPr lvl="1"/>
+            <a:r>
+              <a:rPr lang="en-US" dirty="0"/>
+              <a:t>House hold debt increases - confirmed</a:t>
+            </a:r>
+          </a:p>
+          <a:p>
+            <a:pPr lvl="1"/>
+            <a:r>
+              <a:rPr lang="en-US" dirty="0"/>
+              <a:t>Affordable housing decreases - </a:t>
+            </a:r>
+          </a:p>
+          <a:p>
+            <a:pPr marL="457200" lvl="1" indent="0">
+              <a:buNone/>
+            </a:pPr>
+            <a:endParaRPr lang="en-US" dirty="0"/>
+          </a:p>
+          <a:p>
+            <a:r>
+              <a:rPr lang="en-US" dirty="0"/>
+              <a:t>During deflation</a:t>
+            </a:r>
+          </a:p>
+          <a:p>
+            <a:pPr lvl="1"/>
+            <a:r>
+              <a:rPr lang="en-US" dirty="0"/>
+              <a:t>Housing prices decrease - confirmed</a:t>
+            </a:r>
+          </a:p>
+          <a:p>
+            <a:pPr lvl="1"/>
+            <a:r>
+              <a:rPr lang="en-US" dirty="0"/>
+              <a:t>Mortgage rates decrease – insufficient data</a:t>
+            </a:r>
+          </a:p>
+          <a:p>
+            <a:pPr lvl="1"/>
+            <a:r>
+              <a:rPr lang="en-US" dirty="0"/>
+              <a:t>Occupancy rates decrease and vacancy rates increase - undetermined</a:t>
+            </a:r>
+          </a:p>
+          <a:p>
+            <a:pPr lvl="1"/>
+            <a:r>
+              <a:rPr lang="en-US" dirty="0"/>
+              <a:t>Mortgage defaults and delinquencies increase</a:t>
+            </a:r>
+          </a:p>
+          <a:p>
+            <a:pPr lvl="1"/>
+            <a:r>
+              <a:rPr lang="en-US" dirty="0"/>
+              <a:t>Affordable housing increases</a:t>
             </a:r>
           </a:p>
         </p:txBody>
@@ -4519,7 +4819,7 @@
     </p:spTree>
     <p:extLst>
       <p:ext uri="{BB962C8B-B14F-4D97-AF65-F5344CB8AC3E}">
-        <p14:creationId xmlns:p14="http://schemas.microsoft.com/office/powerpoint/2010/main" val="1131726516"/>
+        <p14:creationId xmlns:p14="http://schemas.microsoft.com/office/powerpoint/2010/main" val="2564554894"/>
       </p:ext>
     </p:extLst>
   </p:cSld>
@@ -4551,6 +4851,500 @@
           <p:cNvPr id="2" name="Title 1">
             <a:extLst>
               <a:ext uri="{FF2B5EF4-FFF2-40B4-BE49-F238E27FC236}">
+                <a16:creationId xmlns:a16="http://schemas.microsoft.com/office/drawing/2014/main" id="{DBEC44FC-34B4-446A-97FD-2821EA882188}"/>
+              </a:ext>
+            </a:extLst>
+          </p:cNvPr>
+          <p:cNvSpPr>
+            <a:spLocks noGrp="1"/>
+          </p:cNvSpPr>
+          <p:nvPr>
+            <p:ph type="title"/>
+          </p:nvPr>
+        </p:nvSpPr>
+        <p:spPr/>
+        <p:txBody>
+          <a:bodyPr/>
+          <a:lstStyle/>
+          <a:p>
+            <a:r>
+              <a:rPr lang="en-US" dirty="0"/>
+              <a:t>Conclusions</a:t>
+            </a:r>
+          </a:p>
+        </p:txBody>
+      </p:sp>
+      <p:sp>
+        <p:nvSpPr>
+          <p:cNvPr id="3" name="Content Placeholder 2">
+            <a:extLst>
+              <a:ext uri="{FF2B5EF4-FFF2-40B4-BE49-F238E27FC236}">
+                <a16:creationId xmlns:a16="http://schemas.microsoft.com/office/drawing/2014/main" id="{386CF659-E75C-4651-8918-40A8978BB7F3}"/>
+              </a:ext>
+            </a:extLst>
+          </p:cNvPr>
+          <p:cNvSpPr>
+            <a:spLocks noGrp="1"/>
+          </p:cNvSpPr>
+          <p:nvPr>
+            <p:ph idx="1"/>
+          </p:nvPr>
+        </p:nvSpPr>
+        <p:spPr/>
+        <p:txBody>
+          <a:bodyPr>
+            <a:normAutofit/>
+          </a:bodyPr>
+          <a:lstStyle/>
+          <a:p>
+            <a:r>
+              <a:rPr lang="en-US" dirty="0"/>
+              <a:t>Current national indicators (mortgage rates, household debt, foreclosure rates) shows no signs of a repeat of the 2007/2008 event.</a:t>
+            </a:r>
+          </a:p>
+          <a:p>
+            <a:r>
+              <a:rPr lang="en-US" dirty="0"/>
+              <a:t>Although the subprime mortgage crisis of 2007/2008 wrecked the overall US economy, based on the HPI and delinquency data, Austin housing was only minorly affected.</a:t>
+            </a:r>
+          </a:p>
+          <a:p>
+            <a:r>
+              <a:rPr lang="en-US" dirty="0"/>
+              <a:t>Based on current data, there are no indicators that suggest Austin is in a housing market bubble.</a:t>
+            </a:r>
+          </a:p>
+        </p:txBody>
+      </p:sp>
+    </p:spTree>
+    <p:extLst>
+      <p:ext uri="{BB962C8B-B14F-4D97-AF65-F5344CB8AC3E}">
+        <p14:creationId xmlns:p14="http://schemas.microsoft.com/office/powerpoint/2010/main" val="4170153595"/>
+      </p:ext>
+    </p:extLst>
+  </p:cSld>
+  <p:clrMapOvr>
+    <a:masterClrMapping/>
+  </p:clrMapOvr>
+</p:sld>
+</file>
+
+<file path=ppt/slides/slide25.xml><?xml version="1.0" encoding="utf-8"?>
+<p:sld xmlns:a="http://schemas.openxmlformats.org/drawingml/2006/main" xmlns:r="http://schemas.openxmlformats.org/officeDocument/2006/relationships" xmlns:p="http://schemas.openxmlformats.org/presentationml/2006/main">
+  <p:cSld>
+    <p:spTree>
+      <p:nvGrpSpPr>
+        <p:cNvPr id="1" name=""/>
+        <p:cNvGrpSpPr/>
+        <p:nvPr/>
+      </p:nvGrpSpPr>
+      <p:grpSpPr>
+        <a:xfrm>
+          <a:off x="0" y="0"/>
+          <a:ext cx="0" cy="0"/>
+          <a:chOff x="0" y="0"/>
+          <a:chExt cx="0" cy="0"/>
+        </a:xfrm>
+      </p:grpSpPr>
+      <p:sp>
+        <p:nvSpPr>
+          <p:cNvPr id="2" name="Title 1">
+            <a:extLst>
+              <a:ext uri="{FF2B5EF4-FFF2-40B4-BE49-F238E27FC236}">
+                <a16:creationId xmlns:a16="http://schemas.microsoft.com/office/drawing/2014/main" id="{7A3BD4D1-02FF-4AEB-ABD4-A2E384C7B83A}"/>
+              </a:ext>
+            </a:extLst>
+          </p:cNvPr>
+          <p:cNvSpPr>
+            <a:spLocks noGrp="1"/>
+          </p:cNvSpPr>
+          <p:nvPr>
+            <p:ph type="title"/>
+          </p:nvPr>
+        </p:nvSpPr>
+        <p:spPr/>
+        <p:txBody>
+          <a:bodyPr/>
+          <a:lstStyle/>
+          <a:p>
+            <a:r>
+              <a:rPr lang="en-US" dirty="0"/>
+              <a:t>Lessons Learned</a:t>
+            </a:r>
+          </a:p>
+        </p:txBody>
+      </p:sp>
+      <p:sp>
+        <p:nvSpPr>
+          <p:cNvPr id="3" name="Content Placeholder 2">
+            <a:extLst>
+              <a:ext uri="{FF2B5EF4-FFF2-40B4-BE49-F238E27FC236}">
+                <a16:creationId xmlns:a16="http://schemas.microsoft.com/office/drawing/2014/main" id="{BDD685D4-3B9C-4934-BC8B-C30D8714B1F0}"/>
+              </a:ext>
+            </a:extLst>
+          </p:cNvPr>
+          <p:cNvSpPr>
+            <a:spLocks noGrp="1"/>
+          </p:cNvSpPr>
+          <p:nvPr>
+            <p:ph idx="1"/>
+          </p:nvPr>
+        </p:nvSpPr>
+        <p:spPr/>
+        <p:txBody>
+          <a:bodyPr/>
+          <a:lstStyle/>
+          <a:p>
+            <a:r>
+              <a:rPr lang="en-US" dirty="0"/>
+              <a:t>Data wrangling; the collection and alignment of data consumed a majority of group work</a:t>
+            </a:r>
+          </a:p>
+          <a:p>
+            <a:pPr lvl="1"/>
+            <a:r>
+              <a:rPr lang="en-US" dirty="0"/>
+              <a:t>MSAs defined differently</a:t>
+            </a:r>
+          </a:p>
+          <a:p>
+            <a:pPr lvl="1"/>
+            <a:r>
+              <a:rPr lang="en-US" dirty="0"/>
+              <a:t>Timelines mis-aligned</a:t>
+            </a:r>
+          </a:p>
+          <a:p>
+            <a:pPr lvl="1"/>
+            <a:r>
+              <a:rPr lang="en-US" dirty="0"/>
+              <a:t>Survey vs. Census</a:t>
+            </a:r>
+          </a:p>
+          <a:p>
+            <a:pPr lvl="1"/>
+            <a:r>
+              <a:rPr lang="en-US" dirty="0"/>
+              <a:t>National vs. Regional vs. State</a:t>
+            </a:r>
+          </a:p>
+          <a:p>
+            <a:r>
+              <a:rPr lang="en-US" dirty="0"/>
+              <a:t>Stumbled learning and using Git and </a:t>
+            </a:r>
+            <a:r>
+              <a:rPr lang="en-US" dirty="0" err="1"/>
+              <a:t>Github</a:t>
+            </a:r>
+            <a:r>
+              <a:rPr lang="en-US" dirty="0"/>
+              <a:t> for collaboration.</a:t>
+            </a:r>
+          </a:p>
+          <a:p>
+            <a:r>
+              <a:rPr lang="en-US" dirty="0"/>
+              <a:t>Leave more time for statistical analysis</a:t>
+            </a:r>
+          </a:p>
+        </p:txBody>
+      </p:sp>
+    </p:spTree>
+    <p:extLst>
+      <p:ext uri="{BB962C8B-B14F-4D97-AF65-F5344CB8AC3E}">
+        <p14:creationId xmlns:p14="http://schemas.microsoft.com/office/powerpoint/2010/main" val="1131726516"/>
+      </p:ext>
+    </p:extLst>
+  </p:cSld>
+  <p:clrMapOvr>
+    <a:masterClrMapping/>
+  </p:clrMapOvr>
+</p:sld>
+</file>
+
+<file path=ppt/slides/slide26.xml><?xml version="1.0" encoding="utf-8"?>
+<p:sld xmlns:a="http://schemas.openxmlformats.org/drawingml/2006/main" xmlns:r="http://schemas.openxmlformats.org/officeDocument/2006/relationships" xmlns:p="http://schemas.openxmlformats.org/presentationml/2006/main">
+  <p:cSld>
+    <p:spTree>
+      <p:nvGrpSpPr>
+        <p:cNvPr id="1" name=""/>
+        <p:cNvGrpSpPr/>
+        <p:nvPr/>
+      </p:nvGrpSpPr>
+      <p:grpSpPr>
+        <a:xfrm>
+          <a:off x="0" y="0"/>
+          <a:ext cx="0" cy="0"/>
+          <a:chOff x="0" y="0"/>
+          <a:chExt cx="0" cy="0"/>
+        </a:xfrm>
+      </p:grpSpPr>
+      <p:sp>
+        <p:nvSpPr>
+          <p:cNvPr id="2" name="Title 1">
+            <a:extLst>
+              <a:ext uri="{FF2B5EF4-FFF2-40B4-BE49-F238E27FC236}">
+                <a16:creationId xmlns:a16="http://schemas.microsoft.com/office/drawing/2014/main" id="{674F786C-00EC-42C2-BCA9-F5AC81A99635}"/>
+              </a:ext>
+            </a:extLst>
+          </p:cNvPr>
+          <p:cNvSpPr>
+            <a:spLocks noGrp="1"/>
+          </p:cNvSpPr>
+          <p:nvPr>
+            <p:ph type="title"/>
+          </p:nvPr>
+        </p:nvSpPr>
+        <p:spPr/>
+        <p:txBody>
+          <a:bodyPr/>
+          <a:lstStyle/>
+          <a:p>
+            <a:r>
+              <a:rPr lang="en-US" dirty="0"/>
+              <a:t>Useful Code Tidbits</a:t>
+            </a:r>
+          </a:p>
+        </p:txBody>
+      </p:sp>
+      <p:sp>
+        <p:nvSpPr>
+          <p:cNvPr id="3" name="Content Placeholder 2">
+            <a:extLst>
+              <a:ext uri="{FF2B5EF4-FFF2-40B4-BE49-F238E27FC236}">
+                <a16:creationId xmlns:a16="http://schemas.microsoft.com/office/drawing/2014/main" id="{D81DF7E0-FCB1-41DF-AA4E-6C13E4D5FBD1}"/>
+              </a:ext>
+            </a:extLst>
+          </p:cNvPr>
+          <p:cNvSpPr>
+            <a:spLocks noGrp="1"/>
+          </p:cNvSpPr>
+          <p:nvPr>
+            <p:ph idx="1"/>
+          </p:nvPr>
+        </p:nvSpPr>
+        <p:spPr/>
+        <p:txBody>
+          <a:bodyPr/>
+          <a:lstStyle/>
+          <a:p>
+            <a:r>
+              <a:rPr lang="en-US" dirty="0"/>
+              <a:t>df3 = </a:t>
+            </a:r>
+            <a:r>
+              <a:rPr lang="en-US" b="1" dirty="0" err="1"/>
+              <a:t>pd.read_excel</a:t>
+            </a:r>
+            <a:r>
+              <a:rPr lang="en-US" dirty="0"/>
+              <a:t>(</a:t>
+            </a:r>
+            <a:r>
+              <a:rPr lang="en-US" dirty="0" err="1"/>
+              <a:t>xls</a:t>
+            </a:r>
+            <a:r>
+              <a:rPr lang="en-US" dirty="0"/>
+              <a:t>, 'Page 3 Data', </a:t>
+            </a:r>
+            <a:r>
+              <a:rPr lang="en-US" dirty="0" err="1"/>
+              <a:t>skiprows</a:t>
+            </a:r>
+            <a:r>
+              <a:rPr lang="en-US" dirty="0"/>
+              <a:t> = [0,1], </a:t>
+            </a:r>
+            <a:r>
+              <a:rPr lang="en-US" dirty="0" err="1"/>
+              <a:t>nrows</a:t>
+            </a:r>
+            <a:r>
+              <a:rPr lang="en-US" dirty="0"/>
+              <a:t> = 7)</a:t>
+            </a:r>
+          </a:p>
+          <a:p>
+            <a:r>
+              <a:rPr lang="en-US" dirty="0" err="1"/>
+              <a:t>axcredit</a:t>
+            </a:r>
+            <a:r>
+              <a:rPr lang="en-US" dirty="0"/>
+              <a:t> = </a:t>
+            </a:r>
+            <a:r>
+              <a:rPr lang="en-US" dirty="0" err="1"/>
+              <a:t>plt.</a:t>
+            </a:r>
+            <a:r>
+              <a:rPr lang="en-US" b="1" dirty="0" err="1"/>
+              <a:t>subplot</a:t>
+            </a:r>
+            <a:r>
+              <a:rPr lang="en-US" b="1" dirty="0"/>
+              <a:t>(2,2,2)</a:t>
+            </a:r>
+            <a:r>
+              <a:rPr lang="en-US" dirty="0"/>
+              <a:t>;   </a:t>
+            </a:r>
+            <a:r>
+              <a:rPr lang="en-US" dirty="0" err="1"/>
+              <a:t>plt.</a:t>
+            </a:r>
+            <a:r>
+              <a:rPr lang="en-US" b="1" dirty="0" err="1"/>
+              <a:t>tight_layout</a:t>
+            </a:r>
+            <a:r>
+              <a:rPr lang="en-US" b="1" dirty="0"/>
+              <a:t>(pad = 2.5)</a:t>
+            </a:r>
+          </a:p>
+        </p:txBody>
+      </p:sp>
+    </p:spTree>
+    <p:extLst>
+      <p:ext uri="{BB962C8B-B14F-4D97-AF65-F5344CB8AC3E}">
+        <p14:creationId xmlns:p14="http://schemas.microsoft.com/office/powerpoint/2010/main" val="2095907869"/>
+      </p:ext>
+    </p:extLst>
+  </p:cSld>
+  <p:clrMapOvr>
+    <a:masterClrMapping/>
+  </p:clrMapOvr>
+</p:sld>
+</file>
+
+<file path=ppt/slides/slide27.xml><?xml version="1.0" encoding="utf-8"?>
+<p:sld xmlns:a="http://schemas.openxmlformats.org/drawingml/2006/main" xmlns:r="http://schemas.openxmlformats.org/officeDocument/2006/relationships" xmlns:p="http://schemas.openxmlformats.org/presentationml/2006/main">
+  <p:cSld>
+    <p:spTree>
+      <p:nvGrpSpPr>
+        <p:cNvPr id="1" name=""/>
+        <p:cNvGrpSpPr/>
+        <p:nvPr/>
+      </p:nvGrpSpPr>
+      <p:grpSpPr>
+        <a:xfrm>
+          <a:off x="0" y="0"/>
+          <a:ext cx="0" cy="0"/>
+          <a:chOff x="0" y="0"/>
+          <a:chExt cx="0" cy="0"/>
+        </a:xfrm>
+      </p:grpSpPr>
+      <p:sp>
+        <p:nvSpPr>
+          <p:cNvPr id="2" name="Title 1">
+            <a:extLst>
+              <a:ext uri="{FF2B5EF4-FFF2-40B4-BE49-F238E27FC236}">
+                <a16:creationId xmlns:a16="http://schemas.microsoft.com/office/drawing/2014/main" id="{674F786C-00EC-42C2-BCA9-F5AC81A99635}"/>
+              </a:ext>
+            </a:extLst>
+          </p:cNvPr>
+          <p:cNvSpPr>
+            <a:spLocks noGrp="1"/>
+          </p:cNvSpPr>
+          <p:nvPr>
+            <p:ph type="title"/>
+          </p:nvPr>
+        </p:nvSpPr>
+        <p:spPr/>
+        <p:txBody>
+          <a:bodyPr/>
+          <a:lstStyle/>
+          <a:p>
+            <a:r>
+              <a:rPr lang="en-US" dirty="0"/>
+              <a:t>Sources</a:t>
+            </a:r>
+          </a:p>
+        </p:txBody>
+      </p:sp>
+      <p:sp>
+        <p:nvSpPr>
+          <p:cNvPr id="3" name="Content Placeholder 2">
+            <a:extLst>
+              <a:ext uri="{FF2B5EF4-FFF2-40B4-BE49-F238E27FC236}">
+                <a16:creationId xmlns:a16="http://schemas.microsoft.com/office/drawing/2014/main" id="{D81DF7E0-FCB1-41DF-AA4E-6C13E4D5FBD1}"/>
+              </a:ext>
+            </a:extLst>
+          </p:cNvPr>
+          <p:cNvSpPr>
+            <a:spLocks noGrp="1"/>
+          </p:cNvSpPr>
+          <p:nvPr>
+            <p:ph idx="1"/>
+          </p:nvPr>
+        </p:nvSpPr>
+        <p:spPr/>
+        <p:txBody>
+          <a:bodyPr/>
+          <a:lstStyle/>
+          <a:p>
+            <a:r>
+              <a:rPr lang="en-US" dirty="0"/>
+              <a:t>Household Debt and Credit Report – NY Fed</a:t>
+            </a:r>
+          </a:p>
+          <a:p>
+            <a:r>
+              <a:rPr lang="en-US" dirty="0"/>
+              <a:t>Homeownership and Vacancy Rates – </a:t>
+            </a:r>
+          </a:p>
+          <a:p>
+            <a:r>
+              <a:rPr lang="en-US" dirty="0"/>
+              <a:t>Housing Price Index – Federal Housing Finance Agency</a:t>
+            </a:r>
+          </a:p>
+          <a:p>
+            <a:r>
+              <a:rPr lang="en-US" dirty="0"/>
+              <a:t>Affordable Housing Inventory</a:t>
+            </a:r>
+          </a:p>
+        </p:txBody>
+      </p:sp>
+    </p:spTree>
+    <p:extLst>
+      <p:ext uri="{BB962C8B-B14F-4D97-AF65-F5344CB8AC3E}">
+        <p14:creationId xmlns:p14="http://schemas.microsoft.com/office/powerpoint/2010/main" val="3342517743"/>
+      </p:ext>
+    </p:extLst>
+  </p:cSld>
+  <p:clrMapOvr>
+    <a:masterClrMapping/>
+  </p:clrMapOvr>
+</p:sld>
+</file>
+
+<file path=ppt/slides/slide28.xml><?xml version="1.0" encoding="utf-8"?>
+<p:sld xmlns:a="http://schemas.openxmlformats.org/drawingml/2006/main" xmlns:r="http://schemas.openxmlformats.org/officeDocument/2006/relationships" xmlns:p="http://schemas.openxmlformats.org/presentationml/2006/main">
+  <p:cSld>
+    <p:spTree>
+      <p:nvGrpSpPr>
+        <p:cNvPr id="1" name=""/>
+        <p:cNvGrpSpPr/>
+        <p:nvPr/>
+      </p:nvGrpSpPr>
+      <p:grpSpPr>
+        <a:xfrm>
+          <a:off x="0" y="0"/>
+          <a:ext cx="0" cy="0"/>
+          <a:chOff x="0" y="0"/>
+          <a:chExt cx="0" cy="0"/>
+        </a:xfrm>
+      </p:grpSpPr>
+      <p:sp>
+        <p:nvSpPr>
+          <p:cNvPr id="2" name="Title 1">
+            <a:extLst>
+              <a:ext uri="{FF2B5EF4-FFF2-40B4-BE49-F238E27FC236}">
                 <a16:creationId xmlns:a16="http://schemas.microsoft.com/office/drawing/2014/main" id="{7A7BB648-EA39-44AF-8779-AA2BD56EC713}"/>
               </a:ext>
             </a:extLst>
@@ -4612,7 +5406,7 @@
 </p:sld>
 </file>
 
-<file path=ppt/slides/slide25.xml><?xml version="1.0" encoding="utf-8"?>
+<file path=ppt/slides/slide29.xml><?xml version="1.0" encoding="utf-8"?>
 <p:sld xmlns:a="http://schemas.openxmlformats.org/drawingml/2006/main" xmlns:r="http://schemas.openxmlformats.org/officeDocument/2006/relationships" xmlns:p="http://schemas.openxmlformats.org/presentationml/2006/main">
   <p:cSld>
     <p:spTree>
@@ -4718,7 +5512,7 @@
           <a:p>
             <a:r>
               <a:rPr lang="en-US" dirty="0"/>
-              <a:t>Approach</a:t>
+              <a:t>Bubble Definition per Investopedia</a:t>
             </a:r>
           </a:p>
         </p:txBody>
@@ -4753,41 +5547,93 @@
           <a:p>
             <a:r>
               <a:rPr lang="en-US" sz="2400" dirty="0"/>
-              <a:t>Evaluate 2007/2008 housing market crash</a:t>
+              <a:t>A </a:t>
+            </a:r>
+            <a:r>
+              <a:rPr lang="en-US" sz="2400" dirty="0">
+                <a:hlinkClick r:id="rId2"/>
+              </a:rPr>
+              <a:t>bubble</a:t>
+            </a:r>
+            <a:r>
+              <a:rPr lang="en-US" sz="2400" dirty="0"/>
+              <a:t> is a type of investing phenomenon that demonstrates the most basic type of "</a:t>
+            </a:r>
+            <a:r>
+              <a:rPr lang="en-US" sz="2400" b="1" dirty="0"/>
+              <a:t>emotional investing</a:t>
+            </a:r>
+            <a:r>
+              <a:rPr lang="en-US" sz="2400" dirty="0"/>
+              <a:t>." A bubble occurs </a:t>
+            </a:r>
+            <a:r>
+              <a:rPr lang="en-US" sz="2400" b="1" dirty="0"/>
+              <a:t>when investors put so much demand </a:t>
+            </a:r>
+            <a:r>
+              <a:rPr lang="en-US" sz="2400" dirty="0"/>
+              <a:t>on a asset that they drive the </a:t>
+            </a:r>
+            <a:r>
+              <a:rPr lang="en-US" sz="2400" b="1" dirty="0"/>
+              <a:t>price beyond any accurate or rational reflection of its actual worth</a:t>
+            </a:r>
+            <a:r>
+              <a:rPr lang="en-US" sz="2400" dirty="0"/>
+              <a:t>. </a:t>
+            </a:r>
+          </a:p>
+          <a:p>
+            <a:endParaRPr lang="en-US" sz="2400" dirty="0"/>
+          </a:p>
+          <a:p>
+            <a:r>
+              <a:rPr lang="en-US" sz="2400" dirty="0"/>
+              <a:t>5 steps to a bubble</a:t>
             </a:r>
           </a:p>
           <a:p>
             <a:pPr lvl="1"/>
             <a:r>
-              <a:rPr lang="en-US" sz="2000" dirty="0"/>
-              <a:t>National indicators – Household Debt, Mortgage Originations, Foreclosures, Delinquency Trends</a:t>
+              <a:rPr lang="en-US" dirty="0"/>
+              <a:t>Displacement – introduction of a new paradigm (tech, interest rates, etc.)</a:t>
             </a:r>
           </a:p>
           <a:p>
             <a:pPr lvl="1"/>
             <a:r>
-              <a:rPr lang="en-US" sz="2000" dirty="0"/>
-              <a:t>Metropolitan Statistical Areas – Housing Price Index, Homeownership Rates, Vacancy Rates</a:t>
-            </a:r>
-          </a:p>
-          <a:p>
-            <a:r>
-              <a:rPr lang="en-US" sz="2400" dirty="0"/>
-              <a:t>Determine cities most impacted by subprime crisis and compare to Austin current environment</a:t>
-            </a:r>
-          </a:p>
-          <a:p>
-            <a:endParaRPr lang="en-US" sz="2400" dirty="0"/>
-          </a:p>
-          <a:p>
-            <a:endParaRPr lang="en-US" sz="2400" dirty="0"/>
+              <a:rPr lang="en-US" dirty="0"/>
+              <a:t>Boom – large scale growth, i.e. ‘fear of missing out.’</a:t>
+            </a:r>
+          </a:p>
+          <a:p>
+            <a:pPr lvl="1"/>
+            <a:r>
+              <a:rPr lang="en-US" dirty="0"/>
+              <a:t>Euphoria – buy regardless of price</a:t>
+            </a:r>
+          </a:p>
+          <a:p>
+            <a:pPr lvl="1"/>
+            <a:r>
+              <a:rPr lang="en-US" dirty="0"/>
+              <a:t>Profit Taking – institution investors (banks, lenders, etc.) exit the market</a:t>
+            </a:r>
+          </a:p>
+          <a:p>
+            <a:pPr lvl="1"/>
+            <a:r>
+              <a:rPr lang="en-US" dirty="0"/>
+              <a:t>Panic – massive liquidation</a:t>
+            </a:r>
           </a:p>
         </p:txBody>
       </p:sp>
     </p:spTree>
     <p:extLst>
       <p:ext uri="{BB962C8B-B14F-4D97-AF65-F5344CB8AC3E}">
-        <p14:creationId xmlns:p14="http://schemas.microsoft.com/office/powerpoint/2010/main" val="1038300587"/>
+        <p14:creationId xmlns:p14="http://schemas.microsoft.com/office/powerpoint/2010/main" val="2326853286"/>
       </p:ext>
     </p:extLst>
   </p:cSld>
@@ -4819,7 +5665,7 @@
           <p:cNvPr id="2" name="Title 1">
             <a:extLst>
               <a:ext uri="{FF2B5EF4-FFF2-40B4-BE49-F238E27FC236}">
-                <a16:creationId xmlns:a16="http://schemas.microsoft.com/office/drawing/2014/main" id="{5A594410-398A-471F-AF6D-47E94C7B12D2}"/>
+                <a16:creationId xmlns:a16="http://schemas.microsoft.com/office/drawing/2014/main" id="{27FC7EB1-E3ED-4F2A-A03C-2B27ADFD2808}"/>
               </a:ext>
             </a:extLst>
           </p:cNvPr>
@@ -4837,40 +5683,127 @@
           <a:p>
             <a:r>
               <a:rPr lang="en-US" dirty="0"/>
-              <a:t>National Indicators</a:t>
-            </a:r>
-          </a:p>
-        </p:txBody>
-      </p:sp>
-      <p:sp>
-        <p:nvSpPr>
-          <p:cNvPr id="3" name="Text Placeholder 2">
-            <a:extLst>
-              <a:ext uri="{FF2B5EF4-FFF2-40B4-BE49-F238E27FC236}">
-                <a16:creationId xmlns:a16="http://schemas.microsoft.com/office/drawing/2014/main" id="{6D9AB881-9189-412B-ADC5-34EC2D77C67F}"/>
-              </a:ext>
-            </a:extLst>
-          </p:cNvPr>
-          <p:cNvSpPr>
-            <a:spLocks noGrp="1"/>
-          </p:cNvSpPr>
-          <p:nvPr>
-            <p:ph type="body" idx="1"/>
+              <a:t>Postulates of a Market Bubble</a:t>
+            </a:r>
+          </a:p>
+        </p:txBody>
+      </p:sp>
+      <p:sp>
+        <p:nvSpPr>
+          <p:cNvPr id="3" name="Content Placeholder 2">
+            <a:extLst>
+              <a:ext uri="{FF2B5EF4-FFF2-40B4-BE49-F238E27FC236}">
+                <a16:creationId xmlns:a16="http://schemas.microsoft.com/office/drawing/2014/main" id="{F54E4C33-6016-4709-AC7C-7286CF64AF45}"/>
+              </a:ext>
+            </a:extLst>
+          </p:cNvPr>
+          <p:cNvSpPr>
+            <a:spLocks noGrp="1"/>
+          </p:cNvSpPr>
+          <p:nvPr>
+            <p:ph idx="1"/>
           </p:nvPr>
         </p:nvSpPr>
         <p:spPr/>
         <p:txBody>
-          <a:bodyPr/>
-          <a:lstStyle/>
-          <a:p>
-            <a:endParaRPr lang="en-US"/>
+          <a:bodyPr>
+            <a:normAutofit fontScale="92500" lnSpcReduction="20000"/>
+          </a:bodyPr>
+          <a:lstStyle/>
+          <a:p>
+            <a:r>
+              <a:rPr lang="en-US" dirty="0"/>
+              <a:t>During expansion</a:t>
+            </a:r>
+          </a:p>
+          <a:p>
+            <a:pPr lvl="1"/>
+            <a:r>
+              <a:rPr lang="en-US" dirty="0"/>
+              <a:t>Housing prices increase</a:t>
+            </a:r>
+          </a:p>
+          <a:p>
+            <a:pPr lvl="1"/>
+            <a:r>
+              <a:rPr lang="en-US" dirty="0"/>
+              <a:t>Mortgage rates increase</a:t>
+            </a:r>
+          </a:p>
+          <a:p>
+            <a:pPr lvl="1"/>
+            <a:r>
+              <a:rPr lang="en-US" dirty="0"/>
+              <a:t>Occupancy rates increase and vacancy rates decrease</a:t>
+            </a:r>
+          </a:p>
+          <a:p>
+            <a:pPr lvl="1"/>
+            <a:r>
+              <a:rPr lang="en-US" dirty="0"/>
+              <a:t>House hold debt increases</a:t>
+            </a:r>
+          </a:p>
+          <a:p>
+            <a:pPr lvl="1"/>
+            <a:r>
+              <a:rPr lang="en-US" dirty="0"/>
+              <a:t>Affordable housing decreases</a:t>
+            </a:r>
+          </a:p>
+          <a:p>
+            <a:pPr marL="457200" lvl="1" indent="0">
+              <a:buNone/>
+            </a:pPr>
+            <a:endParaRPr lang="en-US" dirty="0"/>
+          </a:p>
+          <a:p>
+            <a:r>
+              <a:rPr lang="en-US" dirty="0"/>
+              <a:t>During deflation</a:t>
+            </a:r>
+          </a:p>
+          <a:p>
+            <a:pPr lvl="1"/>
+            <a:r>
+              <a:rPr lang="en-US" dirty="0"/>
+              <a:t>Housing prices decrease</a:t>
+            </a:r>
+          </a:p>
+          <a:p>
+            <a:pPr lvl="1"/>
+            <a:r>
+              <a:rPr lang="en-US" dirty="0"/>
+              <a:t>Mortgage rates decrease</a:t>
+            </a:r>
+          </a:p>
+          <a:p>
+            <a:pPr lvl="1"/>
+            <a:r>
+              <a:rPr lang="en-US" dirty="0"/>
+              <a:t>Occupancy rates decrease and vacancy rates increase</a:t>
+            </a:r>
+          </a:p>
+          <a:p>
+            <a:pPr lvl="1"/>
+            <a:r>
+              <a:rPr lang="en-US" dirty="0"/>
+              <a:t>Mortgage defaults and delinquencies increase</a:t>
+            </a:r>
+          </a:p>
+          <a:p>
+            <a:pPr lvl="1"/>
+            <a:r>
+              <a:rPr lang="en-US" dirty="0"/>
+              <a:t>Affordable housing increases</a:t>
+            </a:r>
           </a:p>
         </p:txBody>
       </p:sp>
     </p:spTree>
     <p:extLst>
       <p:ext uri="{BB962C8B-B14F-4D97-AF65-F5344CB8AC3E}">
-        <p14:creationId xmlns:p14="http://schemas.microsoft.com/office/powerpoint/2010/main" val="4129953649"/>
+        <p14:creationId xmlns:p14="http://schemas.microsoft.com/office/powerpoint/2010/main" val="1166591168"/>
       </p:ext>
     </p:extLst>
   </p:cSld>
@@ -4897,46 +5830,63 @@
           <a:chExt cx="0" cy="0"/>
         </a:xfrm>
       </p:grpSpPr>
-      <p:pic>
-        <p:nvPicPr>
-          <p:cNvPr id="3" name="Picture 2">
-            <a:extLst>
-              <a:ext uri="{FF2B5EF4-FFF2-40B4-BE49-F238E27FC236}">
-                <a16:creationId xmlns:a16="http://schemas.microsoft.com/office/drawing/2014/main" id="{FF775606-9FA2-427A-8795-3351CAEFE772}"/>
-              </a:ext>
-            </a:extLst>
-          </p:cNvPr>
-          <p:cNvPicPr>
-            <a:picLocks noChangeAspect="1"/>
-          </p:cNvPicPr>
-          <p:nvPr/>
-        </p:nvPicPr>
-        <p:blipFill>
-          <a:blip r:embed="rId2">
-            <a:extLst>
-              <a:ext uri="{28A0092B-C50C-407E-A947-70E740481C1C}">
-                <a14:useLocalDpi xmlns:a14="http://schemas.microsoft.com/office/drawing/2010/main" val="0"/>
-              </a:ext>
-            </a:extLst>
-          </a:blip>
-          <a:stretch>
-            <a:fillRect/>
-          </a:stretch>
-        </p:blipFill>
-        <p:spPr>
-          <a:xfrm>
-            <a:off x="0" y="0"/>
-            <a:ext cx="12192000" cy="6858000"/>
-          </a:xfrm>
-          <a:prstGeom prst="rect">
-            <a:avLst/>
-          </a:prstGeom>
-        </p:spPr>
-      </p:pic>
+      <p:sp>
+        <p:nvSpPr>
+          <p:cNvPr id="2" name="Title 1">
+            <a:extLst>
+              <a:ext uri="{FF2B5EF4-FFF2-40B4-BE49-F238E27FC236}">
+                <a16:creationId xmlns:a16="http://schemas.microsoft.com/office/drawing/2014/main" id="{5A594410-398A-471F-AF6D-47E94C7B12D2}"/>
+              </a:ext>
+            </a:extLst>
+          </p:cNvPr>
+          <p:cNvSpPr>
+            <a:spLocks noGrp="1"/>
+          </p:cNvSpPr>
+          <p:nvPr>
+            <p:ph type="title"/>
+          </p:nvPr>
+        </p:nvSpPr>
+        <p:spPr/>
+        <p:txBody>
+          <a:bodyPr/>
+          <a:lstStyle/>
+          <a:p>
+            <a:r>
+              <a:rPr lang="en-US" dirty="0"/>
+              <a:t>National Indicators</a:t>
+            </a:r>
+          </a:p>
+        </p:txBody>
+      </p:sp>
+      <p:sp>
+        <p:nvSpPr>
+          <p:cNvPr id="3" name="Text Placeholder 2">
+            <a:extLst>
+              <a:ext uri="{FF2B5EF4-FFF2-40B4-BE49-F238E27FC236}">
+                <a16:creationId xmlns:a16="http://schemas.microsoft.com/office/drawing/2014/main" id="{6D9AB881-9189-412B-ADC5-34EC2D77C67F}"/>
+              </a:ext>
+            </a:extLst>
+          </p:cNvPr>
+          <p:cNvSpPr>
+            <a:spLocks noGrp="1"/>
+          </p:cNvSpPr>
+          <p:nvPr>
+            <p:ph type="body" idx="1"/>
+          </p:nvPr>
+        </p:nvSpPr>
+        <p:spPr/>
+        <p:txBody>
+          <a:bodyPr/>
+          <a:lstStyle/>
+          <a:p>
+            <a:endParaRPr lang="en-US"/>
+          </a:p>
+        </p:txBody>
+      </p:sp>
     </p:spTree>
     <p:extLst>
       <p:ext uri="{BB962C8B-B14F-4D97-AF65-F5344CB8AC3E}">
-        <p14:creationId xmlns:p14="http://schemas.microsoft.com/office/powerpoint/2010/main" val="2048116837"/>
+        <p14:creationId xmlns:p14="http://schemas.microsoft.com/office/powerpoint/2010/main" val="4129953649"/>
       </p:ext>
     </p:extLst>
   </p:cSld>
@@ -4968,7 +5918,7 @@
           <p:cNvPr id="3" name="Picture 2">
             <a:extLst>
               <a:ext uri="{FF2B5EF4-FFF2-40B4-BE49-F238E27FC236}">
-                <a16:creationId xmlns:a16="http://schemas.microsoft.com/office/drawing/2014/main" id="{BA2D7FBE-4322-4D74-81CF-5F35D8AA5D11}"/>
+                <a16:creationId xmlns:a16="http://schemas.microsoft.com/office/drawing/2014/main" id="{FF775606-9FA2-427A-8795-3351CAEFE772}"/>
               </a:ext>
             </a:extLst>
           </p:cNvPr>
@@ -4999,10 +5949,250 @@
           </a:prstGeom>
         </p:spPr>
       </p:pic>
+      <p:sp>
+        <p:nvSpPr>
+          <p:cNvPr id="2" name="Oval 1">
+            <a:extLst>
+              <a:ext uri="{FF2B5EF4-FFF2-40B4-BE49-F238E27FC236}">
+                <a16:creationId xmlns:a16="http://schemas.microsoft.com/office/drawing/2014/main" id="{BA47F314-C4B5-4CBB-B449-42C3C74DA407}"/>
+              </a:ext>
+            </a:extLst>
+          </p:cNvPr>
+          <p:cNvSpPr/>
+          <p:nvPr/>
+        </p:nvSpPr>
+        <p:spPr>
+          <a:xfrm rot="20167246">
+            <a:off x="643628" y="1187187"/>
+            <a:ext cx="2301439" cy="692554"/>
+          </a:xfrm>
+          <a:prstGeom prst="ellipse">
+            <a:avLst/>
+          </a:prstGeom>
+          <a:noFill/>
+          <a:ln w="38100">
+            <a:solidFill>
+              <a:srgbClr val="FF0000"/>
+            </a:solidFill>
+          </a:ln>
+        </p:spPr>
+        <p:style>
+          <a:lnRef idx="2">
+            <a:schemeClr val="accent1">
+              <a:shade val="50000"/>
+            </a:schemeClr>
+          </a:lnRef>
+          <a:fillRef idx="1">
+            <a:schemeClr val="accent1"/>
+          </a:fillRef>
+          <a:effectRef idx="0">
+            <a:schemeClr val="accent1"/>
+          </a:effectRef>
+          <a:fontRef idx="minor">
+            <a:schemeClr val="lt1"/>
+          </a:fontRef>
+        </p:style>
+        <p:txBody>
+          <a:bodyPr rtlCol="0" anchor="ctr"/>
+          <a:lstStyle/>
+          <a:p>
+            <a:pPr algn="ctr"/>
+            <a:endParaRPr lang="en-US"/>
+          </a:p>
+        </p:txBody>
+      </p:sp>
+      <p:sp>
+        <p:nvSpPr>
+          <p:cNvPr id="4" name="Oval 3">
+            <a:extLst>
+              <a:ext uri="{FF2B5EF4-FFF2-40B4-BE49-F238E27FC236}">
+                <a16:creationId xmlns:a16="http://schemas.microsoft.com/office/drawing/2014/main" id="{E72E62B2-C4BA-4AE5-AAFB-07D4A9D2D86A}"/>
+              </a:ext>
+            </a:extLst>
+          </p:cNvPr>
+          <p:cNvSpPr/>
+          <p:nvPr/>
+        </p:nvSpPr>
+        <p:spPr>
+          <a:xfrm rot="20167246">
+            <a:off x="1259339" y="4907336"/>
+            <a:ext cx="1390035" cy="593124"/>
+          </a:xfrm>
+          <a:prstGeom prst="ellipse">
+            <a:avLst/>
+          </a:prstGeom>
+          <a:noFill/>
+          <a:ln w="38100">
+            <a:solidFill>
+              <a:srgbClr val="FF0000"/>
+            </a:solidFill>
+          </a:ln>
+        </p:spPr>
+        <p:style>
+          <a:lnRef idx="2">
+            <a:schemeClr val="accent1">
+              <a:shade val="50000"/>
+            </a:schemeClr>
+          </a:lnRef>
+          <a:fillRef idx="1">
+            <a:schemeClr val="accent1"/>
+          </a:fillRef>
+          <a:effectRef idx="0">
+            <a:schemeClr val="accent1"/>
+          </a:effectRef>
+          <a:fontRef idx="minor">
+            <a:schemeClr val="lt1"/>
+          </a:fontRef>
+        </p:style>
+        <p:txBody>
+          <a:bodyPr rtlCol="0" anchor="ctr"/>
+          <a:lstStyle/>
+          <a:p>
+            <a:pPr algn="ctr"/>
+            <a:endParaRPr lang="en-US"/>
+          </a:p>
+        </p:txBody>
+      </p:sp>
+      <p:sp>
+        <p:nvSpPr>
+          <p:cNvPr id="5" name="Oval 4">
+            <a:extLst>
+              <a:ext uri="{FF2B5EF4-FFF2-40B4-BE49-F238E27FC236}">
+                <a16:creationId xmlns:a16="http://schemas.microsoft.com/office/drawing/2014/main" id="{B546B7E5-52B2-4FB9-9ACE-FD19957B245A}"/>
+              </a:ext>
+            </a:extLst>
+          </p:cNvPr>
+          <p:cNvSpPr/>
+          <p:nvPr/>
+        </p:nvSpPr>
+        <p:spPr>
+          <a:xfrm>
+            <a:off x="6652727" y="1959429"/>
+            <a:ext cx="1777127" cy="712989"/>
+          </a:xfrm>
+          <a:prstGeom prst="ellipse">
+            <a:avLst/>
+          </a:prstGeom>
+          <a:noFill/>
+          <a:ln w="38100">
+            <a:solidFill>
+              <a:srgbClr val="FF0000"/>
+            </a:solidFill>
+          </a:ln>
+        </p:spPr>
+        <p:style>
+          <a:lnRef idx="2">
+            <a:schemeClr val="accent1">
+              <a:shade val="50000"/>
+            </a:schemeClr>
+          </a:lnRef>
+          <a:fillRef idx="1">
+            <a:schemeClr val="accent1"/>
+          </a:fillRef>
+          <a:effectRef idx="0">
+            <a:schemeClr val="accent1"/>
+          </a:effectRef>
+          <a:fontRef idx="minor">
+            <a:schemeClr val="lt1"/>
+          </a:fontRef>
+        </p:style>
+        <p:txBody>
+          <a:bodyPr rtlCol="0" anchor="ctr"/>
+          <a:lstStyle/>
+          <a:p>
+            <a:pPr algn="ctr"/>
+            <a:endParaRPr lang="en-US"/>
+          </a:p>
+        </p:txBody>
+      </p:sp>
+      <p:sp>
+        <p:nvSpPr>
+          <p:cNvPr id="6" name="TextBox 5">
+            <a:extLst>
+              <a:ext uri="{FF2B5EF4-FFF2-40B4-BE49-F238E27FC236}">
+                <a16:creationId xmlns:a16="http://schemas.microsoft.com/office/drawing/2014/main" id="{B167BCF5-D7A0-489C-9397-BEA19839C951}"/>
+              </a:ext>
+            </a:extLst>
+          </p:cNvPr>
+          <p:cNvSpPr txBox="1"/>
+          <p:nvPr/>
+        </p:nvSpPr>
+        <p:spPr>
+          <a:xfrm>
+            <a:off x="6531429" y="3769567"/>
+            <a:ext cx="5318449" cy="2631233"/>
+          </a:xfrm>
+          <a:prstGeom prst="rect">
+            <a:avLst/>
+          </a:prstGeom>
+          <a:noFill/>
+          <a:ln>
+            <a:solidFill>
+              <a:schemeClr val="tx1"/>
+            </a:solidFill>
+          </a:ln>
+        </p:spPr>
+        <p:txBody>
+          <a:bodyPr wrap="square" rtlCol="0">
+            <a:noAutofit/>
+          </a:bodyPr>
+          <a:lstStyle/>
+          <a:p>
+            <a:pPr marL="285750" indent="-285750">
+              <a:buFont typeface="Arial" panose="020B0604020202020204" pitchFamily="34" charset="0"/>
+              <a:buChar char="•"/>
+            </a:pPr>
+            <a:r>
+              <a:rPr lang="en-US" sz="2400" dirty="0"/>
+              <a:t>Warning signs of the mortgage crisis</a:t>
+            </a:r>
+          </a:p>
+          <a:p>
+            <a:pPr marL="742950" lvl="1" indent="-285750">
+              <a:buFont typeface="Arial" panose="020B0604020202020204" pitchFamily="34" charset="0"/>
+              <a:buChar char="•"/>
+            </a:pPr>
+            <a:r>
+              <a:rPr lang="en-US" sz="2400" dirty="0"/>
+              <a:t>Increased household debt</a:t>
+            </a:r>
+          </a:p>
+          <a:p>
+            <a:pPr marL="742950" lvl="1" indent="-285750">
+              <a:buFont typeface="Arial" panose="020B0604020202020204" pitchFamily="34" charset="0"/>
+              <a:buChar char="•"/>
+            </a:pPr>
+            <a:r>
+              <a:rPr lang="en-US" sz="2400" dirty="0"/>
+              <a:t>Lending to consumers with poor credit scores</a:t>
+            </a:r>
+          </a:p>
+          <a:p>
+            <a:pPr marL="742950" lvl="1" indent="-285750">
+              <a:buFont typeface="Arial" panose="020B0604020202020204" pitchFamily="34" charset="0"/>
+              <a:buChar char="•"/>
+            </a:pPr>
+            <a:r>
+              <a:rPr lang="en-US" sz="2400" dirty="0"/>
+              <a:t>Increasing rate of foreclosures</a:t>
+            </a:r>
+          </a:p>
+          <a:p>
+            <a:pPr marL="742950" lvl="1" indent="-285750">
+              <a:buFont typeface="Arial" panose="020B0604020202020204" pitchFamily="34" charset="0"/>
+              <a:buChar char="•"/>
+            </a:pPr>
+            <a:r>
+              <a:rPr lang="en-US" sz="2400" dirty="0"/>
+              <a:t>Increased delinquencies</a:t>
+            </a:r>
+          </a:p>
+        </p:txBody>
+      </p:sp>
     </p:spTree>
     <p:extLst>
       <p:ext uri="{BB962C8B-B14F-4D97-AF65-F5344CB8AC3E}">
-        <p14:creationId xmlns:p14="http://schemas.microsoft.com/office/powerpoint/2010/main" val="365307594"/>
+        <p14:creationId xmlns:p14="http://schemas.microsoft.com/office/powerpoint/2010/main" val="2048116837"/>
       </p:ext>
     </p:extLst>
   </p:cSld>
@@ -5029,55 +6219,90 @@
           <a:chExt cx="0" cy="0"/>
         </a:xfrm>
       </p:grpSpPr>
-      <p:sp>
-        <p:nvSpPr>
-          <p:cNvPr id="2" name="Title 1">
-            <a:extLst>
-              <a:ext uri="{FF2B5EF4-FFF2-40B4-BE49-F238E27FC236}">
-                <a16:creationId xmlns:a16="http://schemas.microsoft.com/office/drawing/2014/main" id="{545E433E-6B7B-48CF-B60C-21741DC97A83}"/>
-              </a:ext>
-            </a:extLst>
-          </p:cNvPr>
-          <p:cNvSpPr>
-            <a:spLocks noGrp="1"/>
-          </p:cNvSpPr>
-          <p:nvPr>
-            <p:ph type="title"/>
-          </p:nvPr>
-        </p:nvSpPr>
-        <p:spPr/>
-        <p:txBody>
-          <a:bodyPr/>
-          <a:lstStyle/>
-          <a:p>
-            <a:r>
-              <a:rPr lang="en-US" dirty="0"/>
-              <a:t>Housing Price Index</a:t>
-            </a:r>
-          </a:p>
-        </p:txBody>
-      </p:sp>
-      <p:sp>
-        <p:nvSpPr>
-          <p:cNvPr id="3" name="Text Placeholder 2">
-            <a:extLst>
-              <a:ext uri="{FF2B5EF4-FFF2-40B4-BE49-F238E27FC236}">
-                <a16:creationId xmlns:a16="http://schemas.microsoft.com/office/drawing/2014/main" id="{17EA99D9-7AE1-4D3A-AB72-859924CBA368}"/>
-              </a:ext>
-            </a:extLst>
-          </p:cNvPr>
-          <p:cNvSpPr>
-            <a:spLocks noGrp="1"/>
-          </p:cNvSpPr>
-          <p:nvPr>
-            <p:ph type="body" idx="1"/>
-          </p:nvPr>
-        </p:nvSpPr>
-        <p:spPr/>
-        <p:txBody>
-          <a:bodyPr/>
-          <a:lstStyle/>
-          <a:p>
+      <p:pic>
+        <p:nvPicPr>
+          <p:cNvPr id="4" name="Picture 3">
+            <a:extLst>
+              <a:ext uri="{FF2B5EF4-FFF2-40B4-BE49-F238E27FC236}">
+                <a16:creationId xmlns:a16="http://schemas.microsoft.com/office/drawing/2014/main" id="{CBFF057E-CE49-4C62-BC6A-787ECE2AB67F}"/>
+              </a:ext>
+            </a:extLst>
+          </p:cNvPr>
+          <p:cNvPicPr>
+            <a:picLocks noChangeAspect="1"/>
+          </p:cNvPicPr>
+          <p:nvPr/>
+        </p:nvPicPr>
+        <p:blipFill>
+          <a:blip r:embed="rId2">
+            <a:extLst>
+              <a:ext uri="{28A0092B-C50C-407E-A947-70E740481C1C}">
+                <a14:useLocalDpi xmlns:a14="http://schemas.microsoft.com/office/drawing/2010/main" val="0"/>
+              </a:ext>
+            </a:extLst>
+          </a:blip>
+          <a:stretch>
+            <a:fillRect/>
+          </a:stretch>
+        </p:blipFill>
+        <p:spPr>
+          <a:xfrm>
+            <a:off x="0" y="0"/>
+            <a:ext cx="12192000" cy="6858000"/>
+          </a:xfrm>
+          <a:prstGeom prst="rect">
+            <a:avLst/>
+          </a:prstGeom>
+        </p:spPr>
+      </p:pic>
+      <p:sp>
+        <p:nvSpPr>
+          <p:cNvPr id="7" name="Rectangle 6">
+            <a:extLst>
+              <a:ext uri="{FF2B5EF4-FFF2-40B4-BE49-F238E27FC236}">
+                <a16:creationId xmlns:a16="http://schemas.microsoft.com/office/drawing/2014/main" id="{A9046743-DBC2-44A0-A327-64566F736E3F}"/>
+              </a:ext>
+            </a:extLst>
+          </p:cNvPr>
+          <p:cNvSpPr/>
+          <p:nvPr/>
+        </p:nvSpPr>
+        <p:spPr>
+          <a:xfrm>
+            <a:off x="6170726" y="3401006"/>
+            <a:ext cx="5799438" cy="3317789"/>
+          </a:xfrm>
+          <a:prstGeom prst="rect">
+            <a:avLst/>
+          </a:prstGeom>
+          <a:noFill/>
+          <a:ln w="38100">
+            <a:solidFill>
+              <a:schemeClr val="accent1"/>
+            </a:solidFill>
+          </a:ln>
+        </p:spPr>
+        <p:style>
+          <a:lnRef idx="2">
+            <a:schemeClr val="accent1">
+              <a:shade val="50000"/>
+            </a:schemeClr>
+          </a:lnRef>
+          <a:fillRef idx="1">
+            <a:schemeClr val="accent1"/>
+          </a:fillRef>
+          <a:effectRef idx="0">
+            <a:schemeClr val="accent1"/>
+          </a:effectRef>
+          <a:fontRef idx="minor">
+            <a:schemeClr val="lt1"/>
+          </a:fontRef>
+        </p:style>
+        <p:txBody>
+          <a:bodyPr rtlCol="0" anchor="ctr"/>
+          <a:lstStyle/>
+          <a:p>
+            <a:pPr algn="ctr"/>
             <a:endParaRPr lang="en-US"/>
           </a:p>
         </p:txBody>
@@ -5085,7 +6310,7 @@
     </p:spTree>
     <p:extLst>
       <p:ext uri="{BB962C8B-B14F-4D97-AF65-F5344CB8AC3E}">
-        <p14:creationId xmlns:p14="http://schemas.microsoft.com/office/powerpoint/2010/main" val="1853181367"/>
+        <p14:creationId xmlns:p14="http://schemas.microsoft.com/office/powerpoint/2010/main" val="365307594"/>
       </p:ext>
     </p:extLst>
   </p:cSld>
@@ -5112,46 +6337,63 @@
           <a:chExt cx="0" cy="0"/>
         </a:xfrm>
       </p:grpSpPr>
-      <p:pic>
-        <p:nvPicPr>
-          <p:cNvPr id="3" name="Picture 2">
-            <a:extLst>
-              <a:ext uri="{FF2B5EF4-FFF2-40B4-BE49-F238E27FC236}">
-                <a16:creationId xmlns:a16="http://schemas.microsoft.com/office/drawing/2014/main" id="{17D23419-81E1-406B-B486-F81381FA429C}"/>
-              </a:ext>
-            </a:extLst>
-          </p:cNvPr>
-          <p:cNvPicPr>
-            <a:picLocks noChangeAspect="1"/>
-          </p:cNvPicPr>
-          <p:nvPr/>
-        </p:nvPicPr>
-        <p:blipFill>
-          <a:blip r:embed="rId2">
-            <a:extLst>
-              <a:ext uri="{28A0092B-C50C-407E-A947-70E740481C1C}">
-                <a14:useLocalDpi xmlns:a14="http://schemas.microsoft.com/office/drawing/2010/main" val="0"/>
-              </a:ext>
-            </a:extLst>
-          </a:blip>
-          <a:stretch>
-            <a:fillRect/>
-          </a:stretch>
-        </p:blipFill>
-        <p:spPr>
-          <a:xfrm>
-            <a:off x="0" y="0"/>
-            <a:ext cx="12192000" cy="6858000"/>
-          </a:xfrm>
-          <a:prstGeom prst="rect">
-            <a:avLst/>
-          </a:prstGeom>
-        </p:spPr>
-      </p:pic>
+      <p:sp>
+        <p:nvSpPr>
+          <p:cNvPr id="2" name="Title 1">
+            <a:extLst>
+              <a:ext uri="{FF2B5EF4-FFF2-40B4-BE49-F238E27FC236}">
+                <a16:creationId xmlns:a16="http://schemas.microsoft.com/office/drawing/2014/main" id="{545E433E-6B7B-48CF-B60C-21741DC97A83}"/>
+              </a:ext>
+            </a:extLst>
+          </p:cNvPr>
+          <p:cNvSpPr>
+            <a:spLocks noGrp="1"/>
+          </p:cNvSpPr>
+          <p:nvPr>
+            <p:ph type="title"/>
+          </p:nvPr>
+        </p:nvSpPr>
+        <p:spPr/>
+        <p:txBody>
+          <a:bodyPr/>
+          <a:lstStyle/>
+          <a:p>
+            <a:r>
+              <a:rPr lang="en-US" dirty="0"/>
+              <a:t>Housing Price Index</a:t>
+            </a:r>
+          </a:p>
+        </p:txBody>
+      </p:sp>
+      <p:sp>
+        <p:nvSpPr>
+          <p:cNvPr id="3" name="Text Placeholder 2">
+            <a:extLst>
+              <a:ext uri="{FF2B5EF4-FFF2-40B4-BE49-F238E27FC236}">
+                <a16:creationId xmlns:a16="http://schemas.microsoft.com/office/drawing/2014/main" id="{17EA99D9-7AE1-4D3A-AB72-859924CBA368}"/>
+              </a:ext>
+            </a:extLst>
+          </p:cNvPr>
+          <p:cNvSpPr>
+            <a:spLocks noGrp="1"/>
+          </p:cNvSpPr>
+          <p:nvPr>
+            <p:ph type="body" idx="1"/>
+          </p:nvPr>
+        </p:nvSpPr>
+        <p:spPr/>
+        <p:txBody>
+          <a:bodyPr/>
+          <a:lstStyle/>
+          <a:p>
+            <a:endParaRPr lang="en-US"/>
+          </a:p>
+        </p:txBody>
+      </p:sp>
     </p:spTree>
     <p:extLst>
       <p:ext uri="{BB962C8B-B14F-4D97-AF65-F5344CB8AC3E}">
-        <p14:creationId xmlns:p14="http://schemas.microsoft.com/office/powerpoint/2010/main" val="3262938168"/>
+        <p14:creationId xmlns:p14="http://schemas.microsoft.com/office/powerpoint/2010/main" val="1853181367"/>
       </p:ext>
     </p:extLst>
   </p:cSld>
@@ -5183,7 +6425,7 @@
           <p:cNvPr id="3" name="Picture 2">
             <a:extLst>
               <a:ext uri="{FF2B5EF4-FFF2-40B4-BE49-F238E27FC236}">
-                <a16:creationId xmlns:a16="http://schemas.microsoft.com/office/drawing/2014/main" id="{439731A3-5796-4D16-8F0B-A8E6E2B8E3F6}"/>
+                <a16:creationId xmlns:a16="http://schemas.microsoft.com/office/drawing/2014/main" id="{17D23419-81E1-406B-B486-F81381FA429C}"/>
               </a:ext>
             </a:extLst>
           </p:cNvPr>
@@ -5206,8 +6448,8 @@
         </p:blipFill>
         <p:spPr>
           <a:xfrm>
-            <a:off x="3657600" y="0"/>
-            <a:ext cx="4876800" cy="6858000"/>
+            <a:off x="0" y="0"/>
+            <a:ext cx="12192000" cy="6858000"/>
           </a:xfrm>
           <a:prstGeom prst="rect">
             <a:avLst/>
@@ -5217,7 +6459,7 @@
     </p:spTree>
     <p:extLst>
       <p:ext uri="{BB962C8B-B14F-4D97-AF65-F5344CB8AC3E}">
-        <p14:creationId xmlns:p14="http://schemas.microsoft.com/office/powerpoint/2010/main" val="844046032"/>
+        <p14:creationId xmlns:p14="http://schemas.microsoft.com/office/powerpoint/2010/main" val="3262938168"/>
       </p:ext>
     </p:extLst>
   </p:cSld>

</xml_diff>

<commit_message>
Fix bug and add code comments.
</commit_message>
<xml_diff>
--- a/Housing_Bubble.pptx
+++ b/Housing_Bubble.pptx
@@ -314,7 +314,7 @@
           <a:p>
             <a:fld id="{E28927AC-631E-4A5A-9F67-1B6BE6A01BE1}" type="datetimeFigureOut">
               <a:rPr lang="en-US" smtClean="0"/>
-              <a:t>9/5/2018</a:t>
+              <a:t>9/16/2018</a:t>
             </a:fld>
             <a:endParaRPr lang="en-US"/>
           </a:p>
@@ -512,7 +512,7 @@
           <a:p>
             <a:fld id="{E28927AC-631E-4A5A-9F67-1B6BE6A01BE1}" type="datetimeFigureOut">
               <a:rPr lang="en-US" smtClean="0"/>
-              <a:t>9/5/2018</a:t>
+              <a:t>9/16/2018</a:t>
             </a:fld>
             <a:endParaRPr lang="en-US"/>
           </a:p>
@@ -720,7 +720,7 @@
           <a:p>
             <a:fld id="{E28927AC-631E-4A5A-9F67-1B6BE6A01BE1}" type="datetimeFigureOut">
               <a:rPr lang="en-US" smtClean="0"/>
-              <a:t>9/5/2018</a:t>
+              <a:t>9/16/2018</a:t>
             </a:fld>
             <a:endParaRPr lang="en-US"/>
           </a:p>
@@ -918,7 +918,7 @@
           <a:p>
             <a:fld id="{E28927AC-631E-4A5A-9F67-1B6BE6A01BE1}" type="datetimeFigureOut">
               <a:rPr lang="en-US" smtClean="0"/>
-              <a:t>9/5/2018</a:t>
+              <a:t>9/16/2018</a:t>
             </a:fld>
             <a:endParaRPr lang="en-US"/>
           </a:p>
@@ -1193,7 +1193,7 @@
           <a:p>
             <a:fld id="{E28927AC-631E-4A5A-9F67-1B6BE6A01BE1}" type="datetimeFigureOut">
               <a:rPr lang="en-US" smtClean="0"/>
-              <a:t>9/5/2018</a:t>
+              <a:t>9/16/2018</a:t>
             </a:fld>
             <a:endParaRPr lang="en-US"/>
           </a:p>
@@ -1458,7 +1458,7 @@
           <a:p>
             <a:fld id="{E28927AC-631E-4A5A-9F67-1B6BE6A01BE1}" type="datetimeFigureOut">
               <a:rPr lang="en-US" smtClean="0"/>
-              <a:t>9/5/2018</a:t>
+              <a:t>9/16/2018</a:t>
             </a:fld>
             <a:endParaRPr lang="en-US"/>
           </a:p>
@@ -1870,7 +1870,7 @@
           <a:p>
             <a:fld id="{E28927AC-631E-4A5A-9F67-1B6BE6A01BE1}" type="datetimeFigureOut">
               <a:rPr lang="en-US" smtClean="0"/>
-              <a:t>9/5/2018</a:t>
+              <a:t>9/16/2018</a:t>
             </a:fld>
             <a:endParaRPr lang="en-US"/>
           </a:p>
@@ -2011,7 +2011,7 @@
           <a:p>
             <a:fld id="{E28927AC-631E-4A5A-9F67-1B6BE6A01BE1}" type="datetimeFigureOut">
               <a:rPr lang="en-US" smtClean="0"/>
-              <a:t>9/5/2018</a:t>
+              <a:t>9/16/2018</a:t>
             </a:fld>
             <a:endParaRPr lang="en-US"/>
           </a:p>
@@ -2124,7 +2124,7 @@
           <a:p>
             <a:fld id="{E28927AC-631E-4A5A-9F67-1B6BE6A01BE1}" type="datetimeFigureOut">
               <a:rPr lang="en-US" smtClean="0"/>
-              <a:t>9/5/2018</a:t>
+              <a:t>9/16/2018</a:t>
             </a:fld>
             <a:endParaRPr lang="en-US"/>
           </a:p>
@@ -2435,7 +2435,7 @@
           <a:p>
             <a:fld id="{E28927AC-631E-4A5A-9F67-1B6BE6A01BE1}" type="datetimeFigureOut">
               <a:rPr lang="en-US" smtClean="0"/>
-              <a:t>9/5/2018</a:t>
+              <a:t>9/16/2018</a:t>
             </a:fld>
             <a:endParaRPr lang="en-US"/>
           </a:p>
@@ -2723,7 +2723,7 @@
           <a:p>
             <a:fld id="{E28927AC-631E-4A5A-9F67-1B6BE6A01BE1}" type="datetimeFigureOut">
               <a:rPr lang="en-US" smtClean="0"/>
-              <a:t>9/5/2018</a:t>
+              <a:t>9/16/2018</a:t>
             </a:fld>
             <a:endParaRPr lang="en-US"/>
           </a:p>
@@ -2964,7 +2964,7 @@
           <a:p>
             <a:fld id="{E28927AC-631E-4A5A-9F67-1B6BE6A01BE1}" type="datetimeFigureOut">
               <a:rPr lang="en-US" smtClean="0"/>
-              <a:t>9/5/2018</a:t>
+              <a:t>9/16/2018</a:t>
             </a:fld>
             <a:endParaRPr lang="en-US"/>
           </a:p>
@@ -5382,6 +5382,52 @@
             <a:r>
               <a:rPr lang="en-US" b="1" dirty="0"/>
               <a:t>(pad = 2.5)</a:t>
+            </a:r>
+          </a:p>
+          <a:p>
+            <a:r>
+              <a:rPr lang="en-US" dirty="0"/>
+              <a:t>VR = </a:t>
+            </a:r>
+            <a:r>
+              <a:rPr lang="en-US" b="1" dirty="0" err="1"/>
+              <a:t>pd.melt</a:t>
+            </a:r>
+            <a:r>
+              <a:rPr lang="en-US" dirty="0"/>
+              <a:t>(VR, </a:t>
+            </a:r>
+            <a:r>
+              <a:rPr lang="en-US" dirty="0" err="1"/>
+              <a:t>id_vars</a:t>
+            </a:r>
+            <a:r>
+              <a:rPr lang="en-US" dirty="0"/>
+              <a:t>='MSA', </a:t>
+            </a:r>
+            <a:r>
+              <a:rPr lang="en-US" dirty="0" err="1"/>
+              <a:t>value_vars</a:t>
+            </a:r>
+            <a:r>
+              <a:rPr lang="en-US" dirty="0"/>
+              <a:t> = quarters2, </a:t>
+            </a:r>
+            <a:r>
+              <a:rPr lang="en-US" dirty="0" err="1"/>
+              <a:t>var_name</a:t>
+            </a:r>
+            <a:r>
+              <a:rPr lang="en-US" dirty="0"/>
+              <a:t> = "Period", </a:t>
+            </a:r>
+            <a:r>
+              <a:rPr lang="en-US" dirty="0" err="1"/>
+              <a:t>value_name</a:t>
+            </a:r>
+            <a:r>
+              <a:rPr lang="en-US" dirty="0"/>
+              <a:t> = "Rate")</a:t>
             </a:r>
           </a:p>
         </p:txBody>

</xml_diff>